<commit_message>
Correcting step order correction and details.
</commit_message>
<xml_diff>
--- a/Whiteboard design session/WDS trainer presentation - Line-of-business application migration.pptx
+++ b/Whiteboard design session/WDS trainer presentation - Line-of-business application migration.pptx
@@ -6,7 +6,7 @@
     <p:sldMasterId id="2147483665" r:id="rId2"/>
   </p:sldMasterIdLst>
   <p:notesMasterIdLst>
-    <p:notesMasterId r:id="rId40"/>
+    <p:notesMasterId r:id="rId39"/>
   </p:notesMasterIdLst>
   <p:sldIdLst>
     <p:sldId id="300" r:id="rId3"/>
@@ -23,29 +23,28 @@
     <p:sldId id="1935" r:id="rId14"/>
     <p:sldId id="1945" r:id="rId15"/>
     <p:sldId id="320" r:id="rId16"/>
-    <p:sldId id="1946" r:id="rId17"/>
-    <p:sldId id="322" r:id="rId18"/>
-    <p:sldId id="321" r:id="rId19"/>
-    <p:sldId id="317" r:id="rId20"/>
-    <p:sldId id="316" r:id="rId21"/>
-    <p:sldId id="333" r:id="rId22"/>
-    <p:sldId id="1936" r:id="rId23"/>
-    <p:sldId id="1937" r:id="rId24"/>
-    <p:sldId id="1932" r:id="rId25"/>
-    <p:sldId id="1933" r:id="rId26"/>
-    <p:sldId id="1934" r:id="rId27"/>
-    <p:sldId id="1938" r:id="rId28"/>
-    <p:sldId id="1939" r:id="rId29"/>
-    <p:sldId id="1940" r:id="rId30"/>
-    <p:sldId id="1941" r:id="rId31"/>
-    <p:sldId id="329" r:id="rId32"/>
-    <p:sldId id="332" r:id="rId33"/>
-    <p:sldId id="331" r:id="rId34"/>
-    <p:sldId id="330" r:id="rId35"/>
-    <p:sldId id="1943" r:id="rId36"/>
-    <p:sldId id="1947" r:id="rId37"/>
-    <p:sldId id="318" r:id="rId38"/>
-    <p:sldId id="315" r:id="rId39"/>
+    <p:sldId id="322" r:id="rId17"/>
+    <p:sldId id="321" r:id="rId18"/>
+    <p:sldId id="317" r:id="rId19"/>
+    <p:sldId id="316" r:id="rId20"/>
+    <p:sldId id="333" r:id="rId21"/>
+    <p:sldId id="1936" r:id="rId22"/>
+    <p:sldId id="1937" r:id="rId23"/>
+    <p:sldId id="1932" r:id="rId24"/>
+    <p:sldId id="1933" r:id="rId25"/>
+    <p:sldId id="1934" r:id="rId26"/>
+    <p:sldId id="1938" r:id="rId27"/>
+    <p:sldId id="1939" r:id="rId28"/>
+    <p:sldId id="1940" r:id="rId29"/>
+    <p:sldId id="1941" r:id="rId30"/>
+    <p:sldId id="329" r:id="rId31"/>
+    <p:sldId id="332" r:id="rId32"/>
+    <p:sldId id="331" r:id="rId33"/>
+    <p:sldId id="330" r:id="rId34"/>
+    <p:sldId id="1943" r:id="rId35"/>
+    <p:sldId id="1947" r:id="rId36"/>
+    <p:sldId id="318" r:id="rId37"/>
+    <p:sldId id="315" r:id="rId38"/>
   </p:sldIdLst>
   <p:sldSz cx="12192000" cy="6858000"/>
   <p:notesSz cx="6858000" cy="9144000"/>
@@ -234,7 +233,7 @@
           <a:p>
             <a:fld id="{52A13B17-C506-4D51-BB37-16B365906619}" type="datetimeFigureOut">
               <a:rPr lang="en-US" smtClean="0"/>
-              <a:t>9/9/2021</a:t>
+              <a:t>9/22/2021</a:t>
             </a:fld>
             <a:endParaRPr lang="en-US" dirty="0"/>
           </a:p>
@@ -980,7 +979,7 @@
     </p:spTree>
     <p:extLst>
       <p:ext uri="{BB962C8B-B14F-4D97-AF65-F5344CB8AC3E}">
-        <p14:creationId xmlns:p14="http://schemas.microsoft.com/office/powerpoint/2010/main" val="1503293457"/>
+        <p14:creationId xmlns:p14="http://schemas.microsoft.com/office/powerpoint/2010/main" val="251902611"/>
       </p:ext>
     </p:extLst>
   </p:cSld>
@@ -1064,7 +1063,7 @@
     </p:spTree>
     <p:extLst>
       <p:ext uri="{BB962C8B-B14F-4D97-AF65-F5344CB8AC3E}">
-        <p14:creationId xmlns:p14="http://schemas.microsoft.com/office/powerpoint/2010/main" val="251902611"/>
+        <p14:creationId xmlns:p14="http://schemas.microsoft.com/office/powerpoint/2010/main" val="1579283386"/>
       </p:ext>
     </p:extLst>
   </p:cSld>
@@ -1148,7 +1147,7 @@
     </p:spTree>
     <p:extLst>
       <p:ext uri="{BB962C8B-B14F-4D97-AF65-F5344CB8AC3E}">
-        <p14:creationId xmlns:p14="http://schemas.microsoft.com/office/powerpoint/2010/main" val="1579283386"/>
+        <p14:creationId xmlns:p14="http://schemas.microsoft.com/office/powerpoint/2010/main" val="647674203"/>
       </p:ext>
     </p:extLst>
   </p:cSld>
@@ -1232,7 +1231,7 @@
     </p:spTree>
     <p:extLst>
       <p:ext uri="{BB962C8B-B14F-4D97-AF65-F5344CB8AC3E}">
-        <p14:creationId xmlns:p14="http://schemas.microsoft.com/office/powerpoint/2010/main" val="647674203"/>
+        <p14:creationId xmlns:p14="http://schemas.microsoft.com/office/powerpoint/2010/main" val="4179281765"/>
       </p:ext>
     </p:extLst>
   </p:cSld>
@@ -1316,7 +1315,7 @@
     </p:spTree>
     <p:extLst>
       <p:ext uri="{BB962C8B-B14F-4D97-AF65-F5344CB8AC3E}">
-        <p14:creationId xmlns:p14="http://schemas.microsoft.com/office/powerpoint/2010/main" val="4179281765"/>
+        <p14:creationId xmlns:p14="http://schemas.microsoft.com/office/powerpoint/2010/main" val="2058578318"/>
       </p:ext>
     </p:extLst>
   </p:cSld>
@@ -1370,6 +1369,15 @@
           <a:bodyPr/>
           <a:lstStyle/>
           <a:p>
+            <a:r>
+              <a:rPr lang="en-US" dirty="0"/>
+              <a:t>Agentless vs agent-based comparison for VMware: https://docs.microsoft.com/azure/migrate/server-migrate-overview</a:t>
+            </a:r>
+          </a:p>
+          <a:p>
+            <a:endParaRPr lang="en-US" dirty="0"/>
+          </a:p>
+          <a:p>
             <a:endParaRPr lang="en-US" dirty="0"/>
           </a:p>
         </p:txBody>
@@ -1400,7 +1408,7 @@
     </p:spTree>
     <p:extLst>
       <p:ext uri="{BB962C8B-B14F-4D97-AF65-F5344CB8AC3E}">
-        <p14:creationId xmlns:p14="http://schemas.microsoft.com/office/powerpoint/2010/main" val="2058578318"/>
+        <p14:creationId xmlns:p14="http://schemas.microsoft.com/office/powerpoint/2010/main" val="1095388600"/>
       </p:ext>
     </p:extLst>
   </p:cSld>
@@ -1454,27 +1462,21 @@
           <a:bodyPr/>
           <a:lstStyle/>
           <a:p>
-            <a:r>
-              <a:rPr lang="en-US" dirty="0"/>
-              <a:t>Agentless vs agent-based comparison for VMware: https://docs.microsoft.com/azure/migrate/server-migrate-overview</a:t>
-            </a:r>
-          </a:p>
-          <a:p>
-            <a:endParaRPr lang="en-US" dirty="0"/>
-          </a:p>
-          <a:p>
-            <a:endParaRPr lang="en-US" dirty="0"/>
+            <a:endParaRPr lang="en-IE" dirty="0"/>
+          </a:p>
+          <a:p>
+            <a:endParaRPr lang="en-IE" dirty="0"/>
           </a:p>
         </p:txBody>
       </p:sp>
       <p:sp>
         <p:nvSpPr>
-          <p:cNvPr id="4" name="Slide Number Placeholder 3"/>
+          <p:cNvPr id="4" name="Header Placeholder 3"/>
           <p:cNvSpPr>
             <a:spLocks noGrp="1"/>
           </p:cNvSpPr>
           <p:nvPr>
-            <p:ph type="sldNum" sz="quarter" idx="10"/>
+            <p:ph type="hdr" sz="quarter"/>
           </p:nvPr>
         </p:nvSpPr>
         <p:spPr/>
@@ -1482,9 +1484,90 @@
           <a:bodyPr/>
           <a:lstStyle/>
           <a:p>
-            <a:fld id="{0998D5BB-B127-481F-BC0A-2F77C576BB34}" type="slidenum">
+            <a:endParaRPr lang="en-US" dirty="0"/>
+          </a:p>
+        </p:txBody>
+      </p:sp>
+      <p:sp>
+        <p:nvSpPr>
+          <p:cNvPr id="5" name="Footer Placeholder 4"/>
+          <p:cNvSpPr>
+            <a:spLocks noGrp="1"/>
+          </p:cNvSpPr>
+          <p:nvPr>
+            <p:ph type="ftr" sz="quarter" idx="4"/>
+          </p:nvPr>
+        </p:nvSpPr>
+        <p:spPr/>
+        <p:txBody>
+          <a:bodyPr/>
+          <a:lstStyle/>
+          <a:p>
+            <a:pPr defTabSz="914099" eaLnBrk="0" hangingPunct="0"/>
+            <a:r>
+              <a:rPr lang="en-US" sz="400" dirty="0">
+                <a:gradFill>
+                  <a:gsLst>
+                    <a:gs pos="0">
+                      <a:prstClr val="black"/>
+                    </a:gs>
+                    <a:gs pos="100000">
+                      <a:prstClr val="black"/>
+                    </a:gs>
+                  </a:gsLst>
+                  <a:lin ang="5400000" scaled="0"/>
+                </a:gradFill>
+                <a:latin typeface="Segoe UI" pitchFamily="34" charset="0"/>
+                <a:ea typeface="Segoe UI" pitchFamily="34" charset="0"/>
+                <a:cs typeface="Segoe UI" pitchFamily="34" charset="0"/>
+              </a:rPr>
+              <a:t>© Microsoft Corporation. All rights reserved. MICROSOFT MAKES NO WARRANTIES, EXPRESS, IMPLIED OR STATUTORY, AS TO THE INFORMATION IN THIS PRESENTATION.</a:t>
+            </a:r>
+          </a:p>
+        </p:txBody>
+      </p:sp>
+      <p:sp>
+        <p:nvSpPr>
+          <p:cNvPr id="6" name="Date Placeholder 5"/>
+          <p:cNvSpPr>
+            <a:spLocks noGrp="1"/>
+          </p:cNvSpPr>
+          <p:nvPr>
+            <p:ph type="dt" idx="1"/>
+          </p:nvPr>
+        </p:nvSpPr>
+        <p:spPr/>
+        <p:txBody>
+          <a:bodyPr/>
+          <a:lstStyle/>
+          <a:p>
+            <a:fld id="{386CE63F-9E7F-4C04-9D0D-FCA25A8E9E86}" type="datetime8">
               <a:rPr lang="en-US" smtClean="0"/>
-              <a:t>21</a:t>
+              <a:t>9/22/2021 2:36 PM</a:t>
+            </a:fld>
+            <a:endParaRPr lang="en-US" dirty="0"/>
+          </a:p>
+        </p:txBody>
+      </p:sp>
+      <p:sp>
+        <p:nvSpPr>
+          <p:cNvPr id="7" name="Slide Number Placeholder 6"/>
+          <p:cNvSpPr>
+            <a:spLocks noGrp="1"/>
+          </p:cNvSpPr>
+          <p:nvPr>
+            <p:ph type="sldNum" sz="quarter" idx="5"/>
+          </p:nvPr>
+        </p:nvSpPr>
+        <p:spPr/>
+        <p:txBody>
+          <a:bodyPr/>
+          <a:lstStyle/>
+          <a:p>
+            <a:fld id="{B4008EB6-D09E-4580-8CD6-DDB14511944F}" type="slidenum">
+              <a:rPr lang="en-US" smtClean="0"/>
+              <a:pPr/>
+              <a:t>22</a:t>
             </a:fld>
             <a:endParaRPr lang="en-US" dirty="0"/>
           </a:p>
@@ -1493,7 +1576,7 @@
     </p:spTree>
     <p:extLst>
       <p:ext uri="{BB962C8B-B14F-4D97-AF65-F5344CB8AC3E}">
-        <p14:creationId xmlns:p14="http://schemas.microsoft.com/office/powerpoint/2010/main" val="1095388600"/>
+        <p14:creationId xmlns:p14="http://schemas.microsoft.com/office/powerpoint/2010/main" val="3721556546"/>
       </p:ext>
     </p:extLst>
   </p:cSld>
@@ -1712,7 +1795,7 @@
           <a:p>
             <a:fld id="{386CE63F-9E7F-4C04-9D0D-FCA25A8E9E86}" type="datetime8">
               <a:rPr lang="en-US" smtClean="0"/>
-              <a:t>9/9/2021 8:49 AM</a:t>
+              <a:t>9/22/2021 2:36 PM</a:t>
             </a:fld>
             <a:endParaRPr lang="en-US" dirty="0"/>
           </a:p>
@@ -1745,7 +1828,7 @@
     </p:spTree>
     <p:extLst>
       <p:ext uri="{BB962C8B-B14F-4D97-AF65-F5344CB8AC3E}">
-        <p14:creationId xmlns:p14="http://schemas.microsoft.com/office/powerpoint/2010/main" val="3721556546"/>
+        <p14:creationId xmlns:p14="http://schemas.microsoft.com/office/powerpoint/2010/main" val="3838570697"/>
       </p:ext>
     </p:extLst>
   </p:cSld>
@@ -1804,6 +1887,15 @@
           <a:p>
             <a:endParaRPr lang="en-IE" dirty="0"/>
           </a:p>
+          <a:p>
+            <a:endParaRPr lang="en-IE" dirty="0"/>
+          </a:p>
+          <a:p>
+            <a:r>
+              <a:rPr lang="en-IE" dirty="0"/>
+              <a:t>Free for 180 days. Must use a dedicated Log Analytics workspace. No solution other than Service Map may be used with this workspace.</a:t>
+            </a:r>
+          </a:p>
         </p:txBody>
       </p:sp>
       <p:sp>
@@ -1880,7 +1972,7 @@
           <a:p>
             <a:fld id="{386CE63F-9E7F-4C04-9D0D-FCA25A8E9E86}" type="datetime8">
               <a:rPr lang="en-US" smtClean="0"/>
-              <a:t>9/9/2021 8:49 AM</a:t>
+              <a:t>9/22/2021 2:36 PM</a:t>
             </a:fld>
             <a:endParaRPr lang="en-US" dirty="0"/>
           </a:p>
@@ -1913,7 +2005,7 @@
     </p:spTree>
     <p:extLst>
       <p:ext uri="{BB962C8B-B14F-4D97-AF65-F5344CB8AC3E}">
-        <p14:creationId xmlns:p14="http://schemas.microsoft.com/office/powerpoint/2010/main" val="3838570697"/>
+        <p14:creationId xmlns:p14="http://schemas.microsoft.com/office/powerpoint/2010/main" val="3093921661"/>
       </p:ext>
     </p:extLst>
   </p:cSld>
@@ -1972,15 +2064,6 @@
           <a:p>
             <a:endParaRPr lang="en-IE" dirty="0"/>
           </a:p>
-          <a:p>
-            <a:endParaRPr lang="en-IE" dirty="0"/>
-          </a:p>
-          <a:p>
-            <a:r>
-              <a:rPr lang="en-IE" dirty="0"/>
-              <a:t>Free for 180 days. Must use a dedicated Log Analytics workspace. No solution other than Service Map may be used with this workspace.</a:t>
-            </a:r>
-          </a:p>
         </p:txBody>
       </p:sp>
       <p:sp>
@@ -2057,7 +2140,7 @@
           <a:p>
             <a:fld id="{386CE63F-9E7F-4C04-9D0D-FCA25A8E9E86}" type="datetime8">
               <a:rPr lang="en-US" smtClean="0"/>
-              <a:t>9/9/2021 8:49 AM</a:t>
+              <a:t>9/22/2021 2:36 PM</a:t>
             </a:fld>
             <a:endParaRPr lang="en-US" dirty="0"/>
           </a:p>
@@ -2090,7 +2173,7 @@
     </p:spTree>
     <p:extLst>
       <p:ext uri="{BB962C8B-B14F-4D97-AF65-F5344CB8AC3E}">
-        <p14:creationId xmlns:p14="http://schemas.microsoft.com/office/powerpoint/2010/main" val="3093921661"/>
+        <p14:creationId xmlns:p14="http://schemas.microsoft.com/office/powerpoint/2010/main" val="108880782"/>
       </p:ext>
     </p:extLst>
   </p:cSld>
@@ -2149,6 +2232,15 @@
           <a:p>
             <a:endParaRPr lang="en-IE" dirty="0"/>
           </a:p>
+          <a:p>
+            <a:endParaRPr lang="en-IE" dirty="0"/>
+          </a:p>
+          <a:p>
+            <a:r>
+              <a:rPr lang="en-IE" dirty="0"/>
+              <a:t>Free for 180 days. Must use a dedicated Log Analytics workspace. No solution other than Service Map may be used with this workspace.</a:t>
+            </a:r>
+          </a:p>
         </p:txBody>
       </p:sp>
       <p:sp>
@@ -2225,7 +2317,7 @@
           <a:p>
             <a:fld id="{386CE63F-9E7F-4C04-9D0D-FCA25A8E9E86}" type="datetime8">
               <a:rPr lang="en-US" smtClean="0"/>
-              <a:t>9/9/2021 8:49 AM</a:t>
+              <a:t>9/22/2021 2:36 PM</a:t>
             </a:fld>
             <a:endParaRPr lang="en-US" dirty="0"/>
           </a:p>
@@ -2258,7 +2350,7 @@
     </p:spTree>
     <p:extLst>
       <p:ext uri="{BB962C8B-B14F-4D97-AF65-F5344CB8AC3E}">
-        <p14:creationId xmlns:p14="http://schemas.microsoft.com/office/powerpoint/2010/main" val="108880782"/>
+        <p14:creationId xmlns:p14="http://schemas.microsoft.com/office/powerpoint/2010/main" val="217885602"/>
       </p:ext>
     </p:extLst>
   </p:cSld>
@@ -2402,7 +2494,7 @@
           <a:p>
             <a:fld id="{386CE63F-9E7F-4C04-9D0D-FCA25A8E9E86}" type="datetime8">
               <a:rPr lang="en-US" smtClean="0"/>
-              <a:t>9/9/2021 8:49 AM</a:t>
+              <a:t>9/22/2021 2:36 PM</a:t>
             </a:fld>
             <a:endParaRPr lang="en-US" dirty="0"/>
           </a:p>
@@ -2435,7 +2527,7 @@
     </p:spTree>
     <p:extLst>
       <p:ext uri="{BB962C8B-B14F-4D97-AF65-F5344CB8AC3E}">
-        <p14:creationId xmlns:p14="http://schemas.microsoft.com/office/powerpoint/2010/main" val="217885602"/>
+        <p14:creationId xmlns:p14="http://schemas.microsoft.com/office/powerpoint/2010/main" val="4178015033"/>
       </p:ext>
     </p:extLst>
   </p:cSld>
@@ -2579,7 +2671,7 @@
           <a:p>
             <a:fld id="{386CE63F-9E7F-4C04-9D0D-FCA25A8E9E86}" type="datetime8">
               <a:rPr lang="en-US" smtClean="0"/>
-              <a:t>9/9/2021 8:49 AM</a:t>
+              <a:t>9/22/2021 2:36 PM</a:t>
             </a:fld>
             <a:endParaRPr lang="en-US" dirty="0"/>
           </a:p>
@@ -2612,7 +2704,7 @@
     </p:spTree>
     <p:extLst>
       <p:ext uri="{BB962C8B-B14F-4D97-AF65-F5344CB8AC3E}">
-        <p14:creationId xmlns:p14="http://schemas.microsoft.com/office/powerpoint/2010/main" val="4178015033"/>
+        <p14:creationId xmlns:p14="http://schemas.microsoft.com/office/powerpoint/2010/main" val="3801014734"/>
       </p:ext>
     </p:extLst>
   </p:cSld>
@@ -2666,30 +2758,128 @@
           <a:bodyPr/>
           <a:lstStyle/>
           <a:p>
-            <a:endParaRPr lang="en-IE" dirty="0"/>
-          </a:p>
-          <a:p>
-            <a:endParaRPr lang="en-IE" dirty="0"/>
-          </a:p>
-          <a:p>
-            <a:endParaRPr lang="en-IE" dirty="0"/>
-          </a:p>
-          <a:p>
-            <a:r>
-              <a:rPr lang="en-IE" dirty="0"/>
-              <a:t>Free for 180 days. Must use a dedicated Log Analytics workspace. No solution other than Service Map may be used with this workspace.</a:t>
+            <a:r>
+              <a:rPr lang="en-US" sz="1200" b="1" kern="1200" dirty="0">
+                <a:solidFill>
+                  <a:schemeClr val="tx1"/>
+                </a:solidFill>
+                <a:effectLst/>
+                <a:latin typeface="+mn-lt"/>
+                <a:ea typeface="+mn-ea"/>
+                <a:cs typeface="+mn-cs"/>
+              </a:rPr>
+              <a:t>**Objection:**</a:t>
+            </a:r>
+            <a:r>
+              <a:rPr lang="en-US" sz="1200" b="0" kern="1200" dirty="0">
+                <a:solidFill>
+                  <a:schemeClr val="tx1"/>
+                </a:solidFill>
+                <a:effectLst/>
+                <a:latin typeface="+mn-lt"/>
+                <a:ea typeface="+mn-ea"/>
+                <a:cs typeface="+mn-cs"/>
+              </a:rPr>
+              <a:t> Owners of each business application need to approve any substantial application change, including migration. Business owners have indicated that they will require evidence that migration will be successful before granting approval.</a:t>
+            </a:r>
+          </a:p>
+          <a:p>
+            <a:br>
+              <a:rPr lang="en-US" sz="1200" b="0" kern="1200" dirty="0">
+                <a:solidFill>
+                  <a:schemeClr val="tx1"/>
+                </a:solidFill>
+                <a:effectLst/>
+                <a:latin typeface="+mn-lt"/>
+                <a:ea typeface="+mn-ea"/>
+                <a:cs typeface="+mn-cs"/>
+              </a:rPr>
+            </a:br>
+            <a:r>
+              <a:rPr lang="en-US" sz="1200" b="1" kern="1200" dirty="0">
+                <a:solidFill>
+                  <a:schemeClr val="tx1"/>
+                </a:solidFill>
+                <a:effectLst/>
+                <a:latin typeface="+mn-lt"/>
+                <a:ea typeface="+mn-ea"/>
+                <a:cs typeface="+mn-cs"/>
+              </a:rPr>
+              <a:t>**Answer:**</a:t>
+            </a:r>
+            <a:r>
+              <a:rPr lang="en-US" sz="1200" b="0" kern="1200" dirty="0">
+                <a:solidFill>
+                  <a:schemeClr val="tx1"/>
+                </a:solidFill>
+                <a:effectLst/>
+                <a:latin typeface="+mn-lt"/>
+                <a:ea typeface="+mn-ea"/>
+                <a:cs typeface="+mn-cs"/>
+              </a:rPr>
+              <a:t> Migration projects should include creation of a proof of concept deployment, to validate the overall architecture and any assumptions, for example regarding the impact of changes to network latency between application components. This helps build confidence in Azure as a platform for hosting the application.</a:t>
+            </a:r>
+          </a:p>
+          <a:p>
+            <a:br>
+              <a:rPr lang="en-US" sz="1200" b="0" kern="1200" dirty="0">
+                <a:solidFill>
+                  <a:schemeClr val="tx1"/>
+                </a:solidFill>
+                <a:effectLst/>
+                <a:latin typeface="+mn-lt"/>
+                <a:ea typeface="+mn-ea"/>
+                <a:cs typeface="+mn-cs"/>
+              </a:rPr>
+            </a:br>
+            <a:r>
+              <a:rPr lang="en-US" sz="1200" b="0" kern="1200" dirty="0">
+                <a:solidFill>
+                  <a:schemeClr val="tx1"/>
+                </a:solidFill>
+                <a:effectLst/>
+                <a:latin typeface="+mn-lt"/>
+                <a:ea typeface="+mn-ea"/>
+                <a:cs typeface="+mn-cs"/>
+              </a:rPr>
+              <a:t>For the migration process itself, Azure Migrate supports a 'test failover'. This creates the Azure deployment in parallel with the existing deployment, allowing the migration process to be verified without risk of production impact. Likewise, database migration using DMS does not impact the existing production database.</a:t>
+            </a:r>
+          </a:p>
+          <a:p>
+            <a:br>
+              <a:rPr lang="en-US" sz="1200" b="0" kern="1200" dirty="0">
+                <a:solidFill>
+                  <a:schemeClr val="tx1"/>
+                </a:solidFill>
+                <a:effectLst/>
+                <a:latin typeface="+mn-lt"/>
+                <a:ea typeface="+mn-ea"/>
+                <a:cs typeface="+mn-cs"/>
+              </a:rPr>
+            </a:br>
+            <a:r>
+              <a:rPr lang="en-US" sz="1200" b="0" kern="1200" dirty="0">
+                <a:solidFill>
+                  <a:schemeClr val="tx1"/>
+                </a:solidFill>
+                <a:effectLst/>
+                <a:latin typeface="+mn-lt"/>
+                <a:ea typeface="+mn-ea"/>
+                <a:cs typeface="+mn-cs"/>
+              </a:rPr>
+              <a:t>Third-party migration tools used for migration of physical servers similarly support a validation step prior to committing the migration.</a:t>
             </a:r>
           </a:p>
         </p:txBody>
       </p:sp>
       <p:sp>
         <p:nvSpPr>
-          <p:cNvPr id="4" name="Header Placeholder 3"/>
+          <p:cNvPr id="4" name="Slide Number Placeholder 3"/>
           <p:cNvSpPr>
             <a:spLocks noGrp="1"/>
           </p:cNvSpPr>
           <p:nvPr>
-            <p:ph type="hdr" sz="quarter"/>
+            <p:ph type="sldNum" sz="quarter" idx="10"/>
           </p:nvPr>
         </p:nvSpPr>
         <p:spPr/>
@@ -2697,89 +2887,8 @@
           <a:bodyPr/>
           <a:lstStyle/>
           <a:p>
-            <a:endParaRPr lang="en-US" dirty="0"/>
-          </a:p>
-        </p:txBody>
-      </p:sp>
-      <p:sp>
-        <p:nvSpPr>
-          <p:cNvPr id="5" name="Footer Placeholder 4"/>
-          <p:cNvSpPr>
-            <a:spLocks noGrp="1"/>
-          </p:cNvSpPr>
-          <p:nvPr>
-            <p:ph type="ftr" sz="quarter" idx="4"/>
-          </p:nvPr>
-        </p:nvSpPr>
-        <p:spPr/>
-        <p:txBody>
-          <a:bodyPr/>
-          <a:lstStyle/>
-          <a:p>
-            <a:pPr defTabSz="914099" eaLnBrk="0" hangingPunct="0"/>
-            <a:r>
-              <a:rPr lang="en-US" sz="400" dirty="0">
-                <a:gradFill>
-                  <a:gsLst>
-                    <a:gs pos="0">
-                      <a:prstClr val="black"/>
-                    </a:gs>
-                    <a:gs pos="100000">
-                      <a:prstClr val="black"/>
-                    </a:gs>
-                  </a:gsLst>
-                  <a:lin ang="5400000" scaled="0"/>
-                </a:gradFill>
-                <a:latin typeface="Segoe UI" pitchFamily="34" charset="0"/>
-                <a:ea typeface="Segoe UI" pitchFamily="34" charset="0"/>
-                <a:cs typeface="Segoe UI" pitchFamily="34" charset="0"/>
-              </a:rPr>
-              <a:t>© Microsoft Corporation. All rights reserved. MICROSOFT MAKES NO WARRANTIES, EXPRESS, IMPLIED OR STATUTORY, AS TO THE INFORMATION IN THIS PRESENTATION.</a:t>
-            </a:r>
-          </a:p>
-        </p:txBody>
-      </p:sp>
-      <p:sp>
-        <p:nvSpPr>
-          <p:cNvPr id="6" name="Date Placeholder 5"/>
-          <p:cNvSpPr>
-            <a:spLocks noGrp="1"/>
-          </p:cNvSpPr>
-          <p:nvPr>
-            <p:ph type="dt" idx="1"/>
-          </p:nvPr>
-        </p:nvSpPr>
-        <p:spPr/>
-        <p:txBody>
-          <a:bodyPr/>
-          <a:lstStyle/>
-          <a:p>
-            <a:fld id="{386CE63F-9E7F-4C04-9D0D-FCA25A8E9E86}" type="datetime8">
+            <a:fld id="{0998D5BB-B127-481F-BC0A-2F77C576BB34}" type="slidenum">
               <a:rPr lang="en-US" smtClean="0"/>
-              <a:t>9/9/2021 8:49 AM</a:t>
-            </a:fld>
-            <a:endParaRPr lang="en-US" dirty="0"/>
-          </a:p>
-        </p:txBody>
-      </p:sp>
-      <p:sp>
-        <p:nvSpPr>
-          <p:cNvPr id="7" name="Slide Number Placeholder 6"/>
-          <p:cNvSpPr>
-            <a:spLocks noGrp="1"/>
-          </p:cNvSpPr>
-          <p:nvPr>
-            <p:ph type="sldNum" sz="quarter" idx="5"/>
-          </p:nvPr>
-        </p:nvSpPr>
-        <p:spPr/>
-        <p:txBody>
-          <a:bodyPr/>
-          <a:lstStyle/>
-          <a:p>
-            <a:fld id="{B4008EB6-D09E-4580-8CD6-DDB14511944F}" type="slidenum">
-              <a:rPr lang="en-US" smtClean="0"/>
-              <a:pPr/>
               <a:t>29</a:t>
             </a:fld>
             <a:endParaRPr lang="en-US" dirty="0"/>
@@ -2789,7 +2898,7 @@
     </p:spTree>
     <p:extLst>
       <p:ext uri="{BB962C8B-B14F-4D97-AF65-F5344CB8AC3E}">
-        <p14:creationId xmlns:p14="http://schemas.microsoft.com/office/powerpoint/2010/main" val="3801014734"/>
+        <p14:creationId xmlns:p14="http://schemas.microsoft.com/office/powerpoint/2010/main" val="1440095304"/>
       </p:ext>
     </p:extLst>
   </p:cSld>
@@ -2865,7 +2974,7 @@
                 <a:ea typeface="+mn-ea"/>
                 <a:cs typeface="+mn-cs"/>
               </a:rPr>
-              <a:t> Owners of each business application need to approve any substantial application change, including migration. Business owners have indicated that they will require evidence that migration will be successful before granting approval.</a:t>
+              <a:t> Fabrikam have negotiated an Enterprise Agreement (EA) with Microsoft for their Azure consumption. Any cost estimates need to reflect their EA discount.</a:t>
             </a:r>
           </a:p>
           <a:p>
@@ -2902,57 +3011,7 @@
                 <a:ea typeface="+mn-ea"/>
                 <a:cs typeface="+mn-cs"/>
               </a:rPr>
-              <a:t> Migration projects should include creation of a proof of concept deployment, to validate the overall architecture and any assumptions, for example regarding the impact of changes to network latency between application components. This helps build confidence in Azure as a platform for hosting the application.</a:t>
-            </a:r>
-          </a:p>
-          <a:p>
-            <a:br>
-              <a:rPr lang="en-US" sz="1200" b="0" kern="1200" dirty="0">
-                <a:solidFill>
-                  <a:schemeClr val="tx1"/>
-                </a:solidFill>
-                <a:effectLst/>
-                <a:latin typeface="+mn-lt"/>
-                <a:ea typeface="+mn-ea"/>
-                <a:cs typeface="+mn-cs"/>
-              </a:rPr>
-            </a:br>
-            <a:r>
-              <a:rPr lang="en-US" sz="1200" b="0" kern="1200" dirty="0">
-                <a:solidFill>
-                  <a:schemeClr val="tx1"/>
-                </a:solidFill>
-                <a:effectLst/>
-                <a:latin typeface="+mn-lt"/>
-                <a:ea typeface="+mn-ea"/>
-                <a:cs typeface="+mn-cs"/>
-              </a:rPr>
-              <a:t>For the migration process itself, Azure Migrate supports a 'test failover'. This creates the Azure deployment in parallel with the existing deployment, allowing the migration process to be verified without risk of production impact. Likewise, database migration using DMS does not impact the existing production database.</a:t>
-            </a:r>
-          </a:p>
-          <a:p>
-            <a:br>
-              <a:rPr lang="en-US" sz="1200" b="0" kern="1200" dirty="0">
-                <a:solidFill>
-                  <a:schemeClr val="tx1"/>
-                </a:solidFill>
-                <a:effectLst/>
-                <a:latin typeface="+mn-lt"/>
-                <a:ea typeface="+mn-ea"/>
-                <a:cs typeface="+mn-cs"/>
-              </a:rPr>
-            </a:br>
-            <a:r>
-              <a:rPr lang="en-US" sz="1200" b="0" kern="1200" dirty="0">
-                <a:solidFill>
-                  <a:schemeClr val="tx1"/>
-                </a:solidFill>
-                <a:effectLst/>
-                <a:latin typeface="+mn-lt"/>
-                <a:ea typeface="+mn-ea"/>
-                <a:cs typeface="+mn-cs"/>
-              </a:rPr>
-              <a:t>Third-party migration tools used for migration of physical servers similarly support a validation step prior to committing the migration.</a:t>
+              <a:t> Not a problem! Cost estimates from both Azure Migrate and the Azure Pricing Calculator can be tailored to reflect your EA discount.</a:t>
             </a:r>
           </a:p>
         </p:txBody>
@@ -2983,7 +3042,7 @@
     </p:spTree>
     <p:extLst>
       <p:ext uri="{BB962C8B-B14F-4D97-AF65-F5344CB8AC3E}">
-        <p14:creationId xmlns:p14="http://schemas.microsoft.com/office/powerpoint/2010/main" val="1440095304"/>
+        <p14:creationId xmlns:p14="http://schemas.microsoft.com/office/powerpoint/2010/main" val="1807515612"/>
       </p:ext>
     </p:extLst>
   </p:cSld>
@@ -3059,7 +3118,44 @@
                 <a:ea typeface="+mn-ea"/>
                 <a:cs typeface="+mn-cs"/>
               </a:rPr>
-              <a:t> Fabrikam have negotiated an Enterprise Agreement (EA) with Microsoft for their Azure consumption. Any cost estimates need to reflect their EA discount.</a:t>
+              <a:t> Many applications comprise multiple components or tiers. How can you ensure that these migrations are appropriately orchestrated?</a:t>
+            </a:r>
+          </a:p>
+          <a:p>
+            <a:endParaRPr lang="en-US" sz="1200" b="0" kern="1200" dirty="0">
+              <a:solidFill>
+                <a:schemeClr val="tx1"/>
+              </a:solidFill>
+              <a:effectLst/>
+              <a:latin typeface="+mn-lt"/>
+              <a:ea typeface="+mn-ea"/>
+              <a:cs typeface="+mn-cs"/>
+            </a:endParaRPr>
+          </a:p>
+          <a:p>
+            <a:r>
+              <a:rPr lang="en-US" sz="1200" b="1" kern="1200" dirty="0">
+                <a:solidFill>
+                  <a:schemeClr val="tx1"/>
+                </a:solidFill>
+                <a:effectLst/>
+                <a:latin typeface="+mn-lt"/>
+                <a:ea typeface="+mn-ea"/>
+                <a:cs typeface="+mn-cs"/>
+              </a:rPr>
+              <a:t>**Answer:**</a:t>
+            </a:r>
+            <a:r>
+              <a:rPr lang="en-US" sz="1200" b="0" kern="1200" dirty="0">
+                <a:solidFill>
+                  <a:schemeClr val="tx1"/>
+                </a:solidFill>
+                <a:effectLst/>
+                <a:latin typeface="+mn-lt"/>
+                <a:ea typeface="+mn-ea"/>
+                <a:cs typeface="+mn-cs"/>
+              </a:rPr>
+              <a:t> Using Azure Migrate, VMs can be grouped to reflect the application architecture. The dependency visualization feature of Azure Migrate helps identify and configure these groupings.</a:t>
             </a:r>
           </a:p>
           <a:p>
@@ -3075,18 +3171,6 @@
               </a:rPr>
             </a:br>
             <a:r>
-              <a:rPr lang="en-US" sz="1200" b="1" kern="1200" dirty="0">
-                <a:solidFill>
-                  <a:schemeClr val="tx1"/>
-                </a:solidFill>
-                <a:effectLst/>
-                <a:latin typeface="+mn-lt"/>
-                <a:ea typeface="+mn-ea"/>
-                <a:cs typeface="+mn-cs"/>
-              </a:rPr>
-              <a:t>**Answer:**</a:t>
-            </a:r>
-            <a:r>
               <a:rPr lang="en-US" sz="1200" b="0" kern="1200" dirty="0">
                 <a:solidFill>
                   <a:schemeClr val="tx1"/>
@@ -3096,8 +3180,36 @@
                 <a:ea typeface="+mn-ea"/>
                 <a:cs typeface="+mn-cs"/>
               </a:rPr>
-              <a:t> Not a problem! Cost estimates from both Azure Migrate and the Azure Pricing Calculator can be tailored to reflect your EA discount.</a:t>
-            </a:r>
+              <a:t>The migration process can then be staged to migrate different groups of VMs separately. Custom scripts can be used to perform custom pre- and post-migration operations.</a:t>
+            </a:r>
+          </a:p>
+          <a:p>
+            <a:br>
+              <a:rPr lang="en-US" sz="1200" b="0" kern="1200" dirty="0">
+                <a:solidFill>
+                  <a:schemeClr val="tx1"/>
+                </a:solidFill>
+                <a:effectLst/>
+                <a:latin typeface="+mn-lt"/>
+                <a:ea typeface="+mn-ea"/>
+                <a:cs typeface="+mn-cs"/>
+              </a:rPr>
+            </a:br>
+            <a:r>
+              <a:rPr lang="en-US" sz="1200" b="0" kern="1200" dirty="0">
+                <a:solidFill>
+                  <a:schemeClr val="tx1"/>
+                </a:solidFill>
+                <a:effectLst/>
+                <a:latin typeface="+mn-lt"/>
+                <a:ea typeface="+mn-ea"/>
+                <a:cs typeface="+mn-cs"/>
+              </a:rPr>
+              <a:t>Similar orchestration is also supported by third-party migration tools, used for physical servers.</a:t>
+            </a:r>
+          </a:p>
+          <a:p>
+            <a:endParaRPr lang="en-US" dirty="0"/>
           </a:p>
         </p:txBody>
       </p:sp>
@@ -3127,7 +3239,7 @@
     </p:spTree>
     <p:extLst>
       <p:ext uri="{BB962C8B-B14F-4D97-AF65-F5344CB8AC3E}">
-        <p14:creationId xmlns:p14="http://schemas.microsoft.com/office/powerpoint/2010/main" val="1807515612"/>
+        <p14:creationId xmlns:p14="http://schemas.microsoft.com/office/powerpoint/2010/main" val="1536402107"/>
       </p:ext>
     </p:extLst>
   </p:cSld>
@@ -3203,7 +3315,7 @@
                 <a:ea typeface="+mn-ea"/>
                 <a:cs typeface="+mn-cs"/>
               </a:rPr>
-              <a:t> Many applications comprise multiple components or tiers. How can you ensure that these migrations are appropriately orchestrated?</a:t>
+              <a:t> To reduce business impact, each migration should be designed to minimize application downtime. In addition, to reduce risk, there must be an option to fail-back should the migration experience an unexpected problem.</a:t>
             </a:r>
           </a:p>
           <a:p>
@@ -3240,7 +3352,7 @@
                 <a:ea typeface="+mn-ea"/>
                 <a:cs typeface="+mn-cs"/>
               </a:rPr>
-              <a:t> Using Azure Migrate, VMs can be grouped to reflect the application architecture. The dependency visualization feature of Azure Migrate helps identify and configure these groupings.</a:t>
+              <a:t> Migration will always be designed to create the new application deployment in parallel with the existing deployment. This applies to all application tiers, including the database.</a:t>
             </a:r>
           </a:p>
           <a:p>
@@ -3265,7 +3377,21 @@
                 <a:ea typeface="+mn-ea"/>
                 <a:cs typeface="+mn-cs"/>
               </a:rPr>
-              <a:t>The migration process can then be staged to migrate different groups of VMs separately. Custom scripts can be used to perform custom pre- and post-migration operations.</a:t>
+              <a:t>To ensure data consistency during migration, a short application downtime may be required. For application servers migrated using Azure Migrate, incremental replication keeps the duration of this downtime to a minimum, since the initial data transfer can happen while the application is on-line so only deltas need be synchronized during the migration window.</a:t>
+            </a:r>
+          </a:p>
+          <a:p>
+            <a:r>
+              <a:rPr lang="en-US" sz="1200" b="0" kern="1200" dirty="0">
+                <a:solidFill>
+                  <a:schemeClr val="tx1"/>
+                </a:solidFill>
+                <a:effectLst/>
+                <a:latin typeface="+mn-lt"/>
+                <a:ea typeface="+mn-ea"/>
+                <a:cs typeface="+mn-cs"/>
+              </a:rPr>
+              <a:t>Similarly, data migration using DMS supports online migration, allowing you to keep your application online while data is synchronized, and to track the status of any pending changes. Only a short downtime window is required to cut over to the new database.</a:t>
             </a:r>
           </a:p>
           <a:p>
@@ -3290,7 +3416,7 @@
                 <a:ea typeface="+mn-ea"/>
                 <a:cs typeface="+mn-cs"/>
               </a:rPr>
-              <a:t>Similar orchestration is also supported by third-party migration tools, used for physical servers.</a:t>
+              <a:t>In the event of an unexpected issue arising, the existing deployment remains available as a fail-back. If the issue is detected prior to cutting over production traffic to the new service, the on-premises server can immediately pick up where it left off. If the need to fail-back is identified only after the migrated service has received production traffic, then database changes may have occurred, which will need to be reverse-migrated to the on-premises system. This scenario is best avoided by ensuring the migration is properly tested. For critical applications the reverse-migration should be tested (in a test environment) in case it is required.</a:t>
             </a:r>
           </a:p>
           <a:p>
@@ -3324,7 +3450,7 @@
     </p:spTree>
     <p:extLst>
       <p:ext uri="{BB962C8B-B14F-4D97-AF65-F5344CB8AC3E}">
-        <p14:creationId xmlns:p14="http://schemas.microsoft.com/office/powerpoint/2010/main" val="1536402107"/>
+        <p14:creationId xmlns:p14="http://schemas.microsoft.com/office/powerpoint/2010/main" val="1042991434"/>
       </p:ext>
     </p:extLst>
   </p:cSld>
@@ -3484,44 +3610,7 @@
                 <a:ea typeface="+mn-ea"/>
                 <a:cs typeface="+mn-cs"/>
               </a:rPr>
-              <a:t> To reduce business impact, each migration should be designed to minimize application downtime. In addition, to reduce risk, there must be an option to fail-back should the migration experience an unexpected problem.</a:t>
-            </a:r>
-          </a:p>
-          <a:p>
-            <a:endParaRPr lang="en-US" sz="1200" b="0" kern="1200" dirty="0">
-              <a:solidFill>
-                <a:schemeClr val="tx1"/>
-              </a:solidFill>
-              <a:effectLst/>
-              <a:latin typeface="+mn-lt"/>
-              <a:ea typeface="+mn-ea"/>
-              <a:cs typeface="+mn-cs"/>
-            </a:endParaRPr>
-          </a:p>
-          <a:p>
-            <a:r>
-              <a:rPr lang="en-US" sz="1200" b="1" kern="1200" dirty="0">
-                <a:solidFill>
-                  <a:schemeClr val="tx1"/>
-                </a:solidFill>
-                <a:effectLst/>
-                <a:latin typeface="+mn-lt"/>
-                <a:ea typeface="+mn-ea"/>
-                <a:cs typeface="+mn-cs"/>
-              </a:rPr>
-              <a:t>**Answer:**</a:t>
-            </a:r>
-            <a:r>
-              <a:rPr lang="en-US" sz="1200" b="0" kern="1200" dirty="0">
-                <a:solidFill>
-                  <a:schemeClr val="tx1"/>
-                </a:solidFill>
-                <a:effectLst/>
-                <a:latin typeface="+mn-lt"/>
-                <a:ea typeface="+mn-ea"/>
-                <a:cs typeface="+mn-cs"/>
-              </a:rPr>
-              <a:t> Migration will always be designed to create the new application deployment in parallel with the existing deployment. This applies to all application tiers, including the database.</a:t>
+              <a:t> We are expecting to move all our existing infrastructure to Azure. Reducing our on-premises server costs should provide substantial cost savings. Can you confirm what savings we can expect?</a:t>
             </a:r>
           </a:p>
           <a:p>
@@ -3537,6 +3626,18 @@
               </a:rPr>
             </a:br>
             <a:r>
+              <a:rPr lang="en-US" sz="1200" b="1" kern="1200" dirty="0">
+                <a:solidFill>
+                  <a:schemeClr val="tx1"/>
+                </a:solidFill>
+                <a:effectLst/>
+                <a:latin typeface="+mn-lt"/>
+                <a:ea typeface="+mn-ea"/>
+                <a:cs typeface="+mn-cs"/>
+              </a:rPr>
+              <a:t>**Answer:**</a:t>
+            </a:r>
+            <a:r>
               <a:rPr lang="en-US" sz="1200" b="0" kern="1200" dirty="0">
                 <a:solidFill>
                   <a:schemeClr val="tx1"/>
@@ -3546,21 +3647,7 @@
                 <a:ea typeface="+mn-ea"/>
                 <a:cs typeface="+mn-cs"/>
               </a:rPr>
-              <a:t>To ensure data consistency during migration, a short application downtime may be required. For application servers migrated using Azure Migrate, incremental replication keeps the duration of this downtime to a minimum, since the initial data transfer can happen while the application is on-line so only deltas need be synchronized during the migration window.</a:t>
-            </a:r>
-          </a:p>
-          <a:p>
-            <a:r>
-              <a:rPr lang="en-US" sz="1200" b="0" kern="1200" dirty="0">
-                <a:solidFill>
-                  <a:schemeClr val="tx1"/>
-                </a:solidFill>
-                <a:effectLst/>
-                <a:latin typeface="+mn-lt"/>
-                <a:ea typeface="+mn-ea"/>
-                <a:cs typeface="+mn-cs"/>
-              </a:rPr>
-              <a:t>Similarly, data migration using DMS supports online migration, allowing you to keep your application online while data is synchronized, and to track the status of any pending changes. Only a short downtime window is required to cut over to the new database.</a:t>
+              <a:t> It is a common myth that all workloads should move to the cloud, and that the cloud will automatically be cheaper. Careful planning will be required to optimize your Azure deployment, and a cost analysis performed to make sure the business case for migration is sound and fully understood.</a:t>
             </a:r>
           </a:p>
           <a:p>
@@ -3585,11 +3672,32 @@
                 <a:ea typeface="+mn-ea"/>
                 <a:cs typeface="+mn-cs"/>
               </a:rPr>
-              <a:t>In the event of an unexpected issue arising, the existing deployment remains available as a fail-back. If the issue is detected prior to cutting over production traffic to the new service, the on-premises server can immediately pick up where it left off. If the need to fail-back is identified only after the migrated service has received production traffic, then database changes may have occurred, which will need to be reverse-migrated to the on-premises system. This scenario is best avoided by ensuring the migration is properly tested. For critical applications the reverse-migration should be tested (in a test environment) in case it is required.</a:t>
-            </a:r>
-          </a:p>
-          <a:p>
-            <a:endParaRPr lang="en-US" dirty="0"/>
+              <a:t>The [Build a business justification for cloud migration](</a:t>
+            </a:r>
+            <a:r>
+              <a:rPr lang="en-US" sz="1200" b="0" u="sng" kern="1200" dirty="0">
+                <a:solidFill>
+                  <a:schemeClr val="tx1"/>
+                </a:solidFill>
+                <a:effectLst/>
+                <a:latin typeface="+mn-lt"/>
+                <a:ea typeface="+mn-ea"/>
+                <a:cs typeface="+mn-cs"/>
+              </a:rPr>
+              <a:t>https://docs.microsoft.com/azure/architecture/cloud-adoption/business-strategy/cloud-migration-business-case</a:t>
+            </a:r>
+            <a:r>
+              <a:rPr lang="en-US" sz="1200" b="0" kern="1200" dirty="0">
+                <a:solidFill>
+                  <a:schemeClr val="tx1"/>
+                </a:solidFill>
+                <a:effectLst/>
+                <a:latin typeface="+mn-lt"/>
+                <a:ea typeface="+mn-ea"/>
+                <a:cs typeface="+mn-cs"/>
+              </a:rPr>
+              <a:t>) guide is a useful resource for dispelling cloud adoption myths and building a realistic business case.</a:t>
+            </a:r>
           </a:p>
         </p:txBody>
       </p:sp>
@@ -3619,7 +3727,7 @@
     </p:spTree>
     <p:extLst>
       <p:ext uri="{BB962C8B-B14F-4D97-AF65-F5344CB8AC3E}">
-        <p14:creationId xmlns:p14="http://schemas.microsoft.com/office/powerpoint/2010/main" val="1042991434"/>
+        <p14:creationId xmlns:p14="http://schemas.microsoft.com/office/powerpoint/2010/main" val="2696973453"/>
       </p:ext>
     </p:extLst>
   </p:cSld>
@@ -3674,18 +3782,6 @@
           <a:lstStyle/>
           <a:p>
             <a:r>
-              <a:rPr lang="en-US" sz="1200" b="1" kern="1200" dirty="0">
-                <a:solidFill>
-                  <a:schemeClr val="tx1"/>
-                </a:solidFill>
-                <a:effectLst/>
-                <a:latin typeface="+mn-lt"/>
-                <a:ea typeface="+mn-ea"/>
-                <a:cs typeface="+mn-cs"/>
-              </a:rPr>
-              <a:t>**Objection:**</a:t>
-            </a:r>
-            <a:r>
               <a:rPr lang="en-US" sz="1200" b="0" kern="1200" dirty="0">
                 <a:solidFill>
                   <a:schemeClr val="tx1"/>
@@ -3695,11 +3791,21 @@
                 <a:ea typeface="+mn-ea"/>
                 <a:cs typeface="+mn-cs"/>
               </a:rPr>
-              <a:t> We are expecting to move all our existing infrastructure to Azure. Reducing our on-premises server costs should provide substantial cost savings. Can you confirm what savings we can expect?</a:t>
-            </a:r>
-          </a:p>
-          <a:p>
-            <a:br>
+              <a:t>Often running generic use Virtual Machines in Azure, while reliable and easy to migrate, do not offer as many service, ease of use or scaling, or </a:t>
+            </a:r>
+            <a:r>
+              <a:rPr lang="en-US" sz="1200" b="0" kern="1200" dirty="0" err="1">
+                <a:solidFill>
+                  <a:schemeClr val="tx1"/>
+                </a:solidFill>
+                <a:effectLst/>
+                <a:latin typeface="+mn-lt"/>
+                <a:ea typeface="+mn-ea"/>
+                <a:cs typeface="+mn-cs"/>
+              </a:rPr>
+              <a:t>relabiliity</a:t>
+            </a:r>
+            <a:r>
               <a:rPr lang="en-US" sz="1200" b="0" kern="1200" dirty="0">
                 <a:solidFill>
                   <a:schemeClr val="tx1"/>
@@ -3709,19 +3815,21 @@
                 <a:ea typeface="+mn-ea"/>
                 <a:cs typeface="+mn-cs"/>
               </a:rPr>
-            </a:br>
-            <a:r>
-              <a:rPr lang="en-US" sz="1200" b="1" kern="1200" dirty="0">
-                <a:solidFill>
-                  <a:schemeClr val="tx1"/>
-                </a:solidFill>
-                <a:effectLst/>
-                <a:latin typeface="+mn-lt"/>
-                <a:ea typeface="+mn-ea"/>
-                <a:cs typeface="+mn-cs"/>
-              </a:rPr>
-              <a:t>**Answer:**</a:t>
-            </a:r>
+              <a:t> as hosted PaaS services and often are less cost optimal as a general service then an optimized managed solution.  Therefore it is often helpful to identify services that could be augmented or replaced in future updates once those services are deployed in Azure.</a:t>
+            </a:r>
+          </a:p>
+          <a:p>
+            <a:endParaRPr lang="en-US" sz="1200" b="0" kern="1200" dirty="0">
+              <a:solidFill>
+                <a:schemeClr val="tx1"/>
+              </a:solidFill>
+              <a:effectLst/>
+              <a:latin typeface="+mn-lt"/>
+              <a:ea typeface="+mn-ea"/>
+              <a:cs typeface="+mn-cs"/>
+            </a:endParaRPr>
+          </a:p>
+          <a:p>
             <a:r>
               <a:rPr lang="en-US" sz="1200" b="0" kern="1200" dirty="0">
                 <a:solidFill>
@@ -3732,12 +3840,10 @@
                 <a:ea typeface="+mn-ea"/>
                 <a:cs typeface="+mn-cs"/>
               </a:rPr>
-              <a:t> It is a common myth that all workloads should move to the cloud, and that the cloud will automatically be cheaper. Careful planning will be required to optimize your Azure deployment, and a cost analysis performed to make sure the business case for migration is sound and fully understood.</a:t>
-            </a:r>
-          </a:p>
-          <a:p>
-            <a:br>
-              <a:rPr lang="en-US" sz="1200" b="0" kern="1200" dirty="0">
+              <a:t>Some service such as Azure Monitor can be deployed easily but might require more setup &amp; tuning for the environment.  Other services such as moving to AKS may require a fair amount of application redesign or rewrite, but offer a host of dynamic &amp; reliability while providing a quick update and </a:t>
+            </a:r>
+            <a:r>
+              <a:rPr lang="en-US" sz="1200" b="0" kern="1200">
                 <a:solidFill>
                   <a:schemeClr val="tx1"/>
                 </a:solidFill>
@@ -3746,43 +3852,17 @@
                 <a:ea typeface="+mn-ea"/>
                 <a:cs typeface="+mn-cs"/>
               </a:rPr>
-            </a:br>
-            <a:r>
-              <a:rPr lang="en-US" sz="1200" b="0" kern="1200" dirty="0">
-                <a:solidFill>
-                  <a:schemeClr val="tx1"/>
-                </a:solidFill>
-                <a:effectLst/>
-                <a:latin typeface="+mn-lt"/>
-                <a:ea typeface="+mn-ea"/>
-                <a:cs typeface="+mn-cs"/>
-              </a:rPr>
-              <a:t>The [Build a business justification for cloud migration](</a:t>
-            </a:r>
-            <a:r>
-              <a:rPr lang="en-US" sz="1200" b="0" u="sng" kern="1200" dirty="0">
-                <a:solidFill>
-                  <a:schemeClr val="tx1"/>
-                </a:solidFill>
-                <a:effectLst/>
-                <a:latin typeface="+mn-lt"/>
-                <a:ea typeface="+mn-ea"/>
-                <a:cs typeface="+mn-cs"/>
-              </a:rPr>
-              <a:t>https://docs.microsoft.com/azure/architecture/cloud-adoption/business-strategy/cloud-migration-business-case</a:t>
-            </a:r>
-            <a:r>
-              <a:rPr lang="en-US" sz="1200" b="0" kern="1200" dirty="0">
-                <a:solidFill>
-                  <a:schemeClr val="tx1"/>
-                </a:solidFill>
-                <a:effectLst/>
-                <a:latin typeface="+mn-lt"/>
-                <a:ea typeface="+mn-ea"/>
-                <a:cs typeface="+mn-cs"/>
-              </a:rPr>
-              <a:t>) guide is a useful resource for dispelling cloud adoption myths and building a realistic business case.</a:t>
-            </a:r>
+              <a:t>deployment solution.</a:t>
+            </a:r>
+            <a:endParaRPr lang="en-US" sz="1200" b="0" kern="1200" dirty="0">
+              <a:solidFill>
+                <a:schemeClr val="tx1"/>
+              </a:solidFill>
+              <a:effectLst/>
+              <a:latin typeface="+mn-lt"/>
+              <a:ea typeface="+mn-ea"/>
+              <a:cs typeface="+mn-cs"/>
+            </a:endParaRPr>
           </a:p>
         </p:txBody>
       </p:sp>
@@ -3812,7 +3892,7 @@
     </p:spTree>
     <p:extLst>
       <p:ext uri="{BB962C8B-B14F-4D97-AF65-F5344CB8AC3E}">
-        <p14:creationId xmlns:p14="http://schemas.microsoft.com/office/powerpoint/2010/main" val="2696973453"/>
+        <p14:creationId xmlns:p14="http://schemas.microsoft.com/office/powerpoint/2010/main" val="3272936101"/>
       </p:ext>
     </p:extLst>
   </p:cSld>
@@ -3866,88 +3946,7 @@
           <a:bodyPr/>
           <a:lstStyle/>
           <a:p>
-            <a:r>
-              <a:rPr lang="en-US" sz="1200" b="0" kern="1200" dirty="0">
-                <a:solidFill>
-                  <a:schemeClr val="tx1"/>
-                </a:solidFill>
-                <a:effectLst/>
-                <a:latin typeface="+mn-lt"/>
-                <a:ea typeface="+mn-ea"/>
-                <a:cs typeface="+mn-cs"/>
-              </a:rPr>
-              <a:t>Often running generic use Virtual Machines in Azure, while reliable and easy to migrate, do not offer as many service, ease of use or scaling, or </a:t>
-            </a:r>
-            <a:r>
-              <a:rPr lang="en-US" sz="1200" b="0" kern="1200" dirty="0" err="1">
-                <a:solidFill>
-                  <a:schemeClr val="tx1"/>
-                </a:solidFill>
-                <a:effectLst/>
-                <a:latin typeface="+mn-lt"/>
-                <a:ea typeface="+mn-ea"/>
-                <a:cs typeface="+mn-cs"/>
-              </a:rPr>
-              <a:t>relabiliity</a:t>
-            </a:r>
-            <a:r>
-              <a:rPr lang="en-US" sz="1200" b="0" kern="1200" dirty="0">
-                <a:solidFill>
-                  <a:schemeClr val="tx1"/>
-                </a:solidFill>
-                <a:effectLst/>
-                <a:latin typeface="+mn-lt"/>
-                <a:ea typeface="+mn-ea"/>
-                <a:cs typeface="+mn-cs"/>
-              </a:rPr>
-              <a:t> as hosted PaaS services and often are less cost optimal as a general service then an optimized managed solution.  Therefore it is often helpful to identify services that could be augmented or replaced in future updates once those services are deployed in Azure.</a:t>
-            </a:r>
-          </a:p>
-          <a:p>
-            <a:endParaRPr lang="en-US" sz="1200" b="0" kern="1200" dirty="0">
-              <a:solidFill>
-                <a:schemeClr val="tx1"/>
-              </a:solidFill>
-              <a:effectLst/>
-              <a:latin typeface="+mn-lt"/>
-              <a:ea typeface="+mn-ea"/>
-              <a:cs typeface="+mn-cs"/>
-            </a:endParaRPr>
-          </a:p>
-          <a:p>
-            <a:r>
-              <a:rPr lang="en-US" sz="1200" b="0" kern="1200" dirty="0">
-                <a:solidFill>
-                  <a:schemeClr val="tx1"/>
-                </a:solidFill>
-                <a:effectLst/>
-                <a:latin typeface="+mn-lt"/>
-                <a:ea typeface="+mn-ea"/>
-                <a:cs typeface="+mn-cs"/>
-              </a:rPr>
-              <a:t>Some service such as Azure Monitor can be deployed easily but might require more setup &amp; tuning for the environment.  Other services such as moving to AKS may require a fair amount of application redesign or rewrite, but offer a host of dynamic &amp; reliability while providing a quick update and </a:t>
-            </a:r>
-            <a:r>
-              <a:rPr lang="en-US" sz="1200" b="0" kern="1200">
-                <a:solidFill>
-                  <a:schemeClr val="tx1"/>
-                </a:solidFill>
-                <a:effectLst/>
-                <a:latin typeface="+mn-lt"/>
-                <a:ea typeface="+mn-ea"/>
-                <a:cs typeface="+mn-cs"/>
-              </a:rPr>
-              <a:t>deployment solution.</a:t>
-            </a:r>
-            <a:endParaRPr lang="en-US" sz="1200" b="0" kern="1200" dirty="0">
-              <a:solidFill>
-                <a:schemeClr val="tx1"/>
-              </a:solidFill>
-              <a:effectLst/>
-              <a:latin typeface="+mn-lt"/>
-              <a:ea typeface="+mn-ea"/>
-              <a:cs typeface="+mn-cs"/>
-            </a:endParaRPr>
+            <a:endParaRPr lang="en-US" dirty="0"/>
           </a:p>
         </p:txBody>
       </p:sp>
@@ -3977,7 +3976,7 @@
     </p:spTree>
     <p:extLst>
       <p:ext uri="{BB962C8B-B14F-4D97-AF65-F5344CB8AC3E}">
-        <p14:creationId xmlns:p14="http://schemas.microsoft.com/office/powerpoint/2010/main" val="3272936101"/>
+        <p14:creationId xmlns:p14="http://schemas.microsoft.com/office/powerpoint/2010/main" val="671285550"/>
       </p:ext>
     </p:extLst>
   </p:cSld>
@@ -4014,90 +4013,6 @@
             <p:ph type="sldImg"/>
           </p:nvPr>
         </p:nvSpPr>
-        <p:spPr/>
-      </p:sp>
-      <p:sp>
-        <p:nvSpPr>
-          <p:cNvPr id="3" name="Notes Placeholder 2"/>
-          <p:cNvSpPr>
-            <a:spLocks noGrp="1"/>
-          </p:cNvSpPr>
-          <p:nvPr>
-            <p:ph type="body" idx="1"/>
-          </p:nvPr>
-        </p:nvSpPr>
-        <p:spPr/>
-        <p:txBody>
-          <a:bodyPr/>
-          <a:lstStyle/>
-          <a:p>
-            <a:endParaRPr lang="en-US" dirty="0"/>
-          </a:p>
-        </p:txBody>
-      </p:sp>
-      <p:sp>
-        <p:nvSpPr>
-          <p:cNvPr id="4" name="Slide Number Placeholder 3"/>
-          <p:cNvSpPr>
-            <a:spLocks noGrp="1"/>
-          </p:cNvSpPr>
-          <p:nvPr>
-            <p:ph type="sldNum" sz="quarter" idx="10"/>
-          </p:nvPr>
-        </p:nvSpPr>
-        <p:spPr/>
-        <p:txBody>
-          <a:bodyPr/>
-          <a:lstStyle/>
-          <a:p>
-            <a:fld id="{0998D5BB-B127-481F-BC0A-2F77C576BB34}" type="slidenum">
-              <a:rPr lang="en-US" smtClean="0"/>
-              <a:t>36</a:t>
-            </a:fld>
-            <a:endParaRPr lang="en-US" dirty="0"/>
-          </a:p>
-        </p:txBody>
-      </p:sp>
-    </p:spTree>
-    <p:extLst>
-      <p:ext uri="{BB962C8B-B14F-4D97-AF65-F5344CB8AC3E}">
-        <p14:creationId xmlns:p14="http://schemas.microsoft.com/office/powerpoint/2010/main" val="671285550"/>
-      </p:ext>
-    </p:extLst>
-  </p:cSld>
-  <p:clrMapOvr>
-    <a:masterClrMapping/>
-  </p:clrMapOvr>
-</p:notes>
-</file>
-
-<file path=ppt/notesSlides/notesSlide34.xml><?xml version="1.0" encoding="utf-8"?>
-<p:notes xmlns:a="http://schemas.openxmlformats.org/drawingml/2006/main" xmlns:r="http://schemas.openxmlformats.org/officeDocument/2006/relationships" xmlns:p="http://schemas.openxmlformats.org/presentationml/2006/main">
-  <p:cSld>
-    <p:spTree>
-      <p:nvGrpSpPr>
-        <p:cNvPr id="1" name=""/>
-        <p:cNvGrpSpPr/>
-        <p:nvPr/>
-      </p:nvGrpSpPr>
-      <p:grpSpPr>
-        <a:xfrm>
-          <a:off x="0" y="0"/>
-          <a:ext cx="0" cy="0"/>
-          <a:chOff x="0" y="0"/>
-          <a:chExt cx="0" cy="0"/>
-        </a:xfrm>
-      </p:grpSpPr>
-      <p:sp>
-        <p:nvSpPr>
-          <p:cNvPr id="2" name="Slide Image Placeholder 1"/>
-          <p:cNvSpPr>
-            <a:spLocks noGrp="1" noRot="1" noChangeAspect="1"/>
-          </p:cNvSpPr>
-          <p:nvPr>
-            <p:ph type="sldImg"/>
-          </p:nvPr>
-        </p:nvSpPr>
         <p:spPr>
           <a:xfrm>
             <a:off x="381000" y="685800"/>
@@ -4178,7 +4093,7 @@
                   <a:prstClr val="black"/>
                 </a:solidFill>
               </a:rPr>
-              <a:t>9/9/2021 8:49 AM</a:t>
+              <a:t>9/22/2021 2:36 PM</a:t>
             </a:fld>
             <a:endParaRPr lang="en-US" dirty="0">
               <a:solidFill>
@@ -4210,7 +4125,7 @@
                 </a:solidFill>
               </a:rPr>
               <a:pPr/>
-              <a:t>37</a:t>
+              <a:t>36</a:t>
             </a:fld>
             <a:endParaRPr lang="en-US" dirty="0">
               <a:solidFill>
@@ -19052,7 +18967,7 @@
                 <a:latin typeface="Segoe UI Semilight" panose="020B0402040204020203" pitchFamily="34" charset="0"/>
                 <a:cs typeface="Segoe UI Semilight" panose="020B0402040204020203" pitchFamily="34" charset="0"/>
               </a:rPr>
-              <a:t>45 minutes</a:t>
+              <a:t>60 minutes</a:t>
             </a:r>
           </a:p>
         </p:txBody>
@@ -19072,14 +18987,14 @@
           <p:nvPr>
             <p:extLst>
               <p:ext uri="{D42A27DB-BD31-4B8C-83A1-F6EECF244321}">
-                <p14:modId xmlns:p14="http://schemas.microsoft.com/office/powerpoint/2010/main" val="1406366829"/>
+                <p14:modId xmlns:p14="http://schemas.microsoft.com/office/powerpoint/2010/main" val="2168869701"/>
               </p:ext>
             </p:extLst>
           </p:nvPr>
         </p:nvGraphicFramePr>
         <p:xfrm>
           <a:off x="3095545" y="3791921"/>
-          <a:ext cx="8040154" cy="2420452"/>
+          <a:ext cx="8040154" cy="2788016"/>
         </p:xfrm>
         <a:graphic>
           <a:graphicData uri="http://schemas.openxmlformats.org/drawingml/2006/table">
@@ -19198,7 +19113,7 @@
                   </a:ext>
                 </a:extLst>
               </a:tr>
-              <a:tr h="672348">
+              <a:tr h="550644">
                 <a:tc>
                   <a:txBody>
                     <a:bodyPr/>
@@ -19354,6 +19269,39 @@
                     <a:bodyPr/>
                     <a:lstStyle/>
                     <a:p>
+                      <a:pPr marL="285750" marR="0" lvl="0" indent="-285750" algn="l" defTabSz="914367" rtl="0" eaLnBrk="1" fontAlgn="auto" latinLnBrk="0" hangingPunct="1">
+                        <a:lnSpc>
+                          <a:spcPct val="100000"/>
+                        </a:lnSpc>
+                        <a:spcBef>
+                          <a:spcPts val="0"/>
+                        </a:spcBef>
+                        <a:spcAft>
+                          <a:spcPts val="0"/>
+                        </a:spcAft>
+                        <a:buClrTx/>
+                        <a:buSzTx/>
+                        <a:buFont typeface="Arial" panose="020B0604020202020204" pitchFamily="34" charset="0"/>
+                        <a:buChar char="•"/>
+                        <a:tabLst/>
+                        <a:defRPr/>
+                      </a:pPr>
+                      <a:r>
+                        <a:rPr lang="en-US" sz="1300" b="0" dirty="0">
+                          <a:solidFill>
+                            <a:schemeClr val="bg1"/>
+                          </a:solidFill>
+                          <a:latin typeface="Segoe UI" panose="020B0502040204020203" pitchFamily="34" charset="0"/>
+                          <a:cs typeface="Segoe UI" panose="020B0502040204020203" pitchFamily="34" charset="0"/>
+                        </a:rPr>
+                        <a:t>Identify future options for existing resources that are in use today that could be augmented or replaced.</a:t>
+                      </a:r>
+                      <a:endParaRPr lang="en-US" sz="1300" dirty="0">
+                        <a:latin typeface="Segoe UI" panose="020B0502040204020203" pitchFamily="34" charset="0"/>
+                        <a:cs typeface="Segoe UI" panose="020B0502040204020203" pitchFamily="34" charset="0"/>
+                      </a:endParaRPr>
+                    </a:p>
+                    <a:p>
                       <a:pPr marL="285750" lvl="0" indent="-285750">
                         <a:buFont typeface="Arial" panose="020B0604020202020204" pitchFamily="34" charset="0"/>
                         <a:buChar char="•"/>
@@ -19476,12 +19424,7 @@
             <p:ph type="title"/>
           </p:nvPr>
         </p:nvSpPr>
-        <p:spPr>
-          <a:xfrm>
-            <a:off x="291012" y="289511"/>
-            <a:ext cx="11655840" cy="899665"/>
-          </a:xfrm>
-        </p:spPr>
+        <p:spPr/>
         <p:txBody>
           <a:bodyPr>
             <a:normAutofit/>
@@ -19496,7 +19439,7 @@
                 <a:latin typeface="Segoe UI Light" panose="020B0502040204020203" pitchFamily="34" charset="0"/>
                 <a:cs typeface="Segoe UI Light" panose="020B0502040204020203" pitchFamily="34" charset="0"/>
               </a:rPr>
-              <a:t>Step 3: Future Design Proposals</a:t>
+              <a:t>Step 3: Present the solution</a:t>
             </a:r>
           </a:p>
         </p:txBody>
@@ -19515,8 +19458,8 @@
         </p:nvSpPr>
         <p:spPr>
           <a:xfrm>
-            <a:off x="362057" y="1741246"/>
-            <a:ext cx="10652686" cy="2930033"/>
+            <a:off x="340285" y="1062166"/>
+            <a:ext cx="10229103" cy="5838521"/>
           </a:xfrm>
           <a:prstGeom prst="rect">
             <a:avLst/>
@@ -19558,8 +19501,11 @@
                 <a:latin typeface="Segoe UI Semilight" panose="020B0402040204020203" pitchFamily="34" charset="0"/>
                 <a:cs typeface="Segoe UI Semilight" panose="020B0402040204020203" pitchFamily="34" charset="0"/>
               </a:rPr>
-              <a:t>Design a solution and prepare to present the solution to the target customer audience in a 15-minute chalk-talk format. </a:t>
-            </a:r>
+              <a:t>Present a solution to the target customer in a 15-minute chalk-talk format. </a:t>
+            </a:r>
+            <a:endParaRPr lang="en-US" sz="3600" dirty="0">
+              <a:latin typeface="+mj-lt"/>
+            </a:endParaRPr>
           </a:p>
           <a:p>
             <a:pPr>
@@ -19570,7 +19516,9 @@
                 <a:spcPts val="600"/>
               </a:spcAft>
             </a:pPr>
-            <a:endParaRPr lang="en-US" sz="2400" dirty="0"/>
+            <a:endParaRPr lang="en-US" sz="2400" dirty="0">
+              <a:latin typeface="+mj-lt"/>
+            </a:endParaRPr>
           </a:p>
           <a:p>
             <a:pPr>
@@ -19602,397 +19550,151 @@
                 <a:latin typeface="Segoe UI Semilight" panose="020B0402040204020203" pitchFamily="34" charset="0"/>
                 <a:cs typeface="Segoe UI Semilight" panose="020B0402040204020203" pitchFamily="34" charset="0"/>
               </a:rPr>
-              <a:t>30 minutes</a:t>
-            </a:r>
+              <a:t>30 minutes (15 minutes for each team to present and receive feedback) </a:t>
+            </a:r>
+          </a:p>
+          <a:p>
+            <a:pPr>
+              <a:lnSpc>
+                <a:spcPct val="90000"/>
+              </a:lnSpc>
+              <a:spcAft>
+                <a:spcPts val="600"/>
+              </a:spcAft>
+            </a:pPr>
+            <a:endParaRPr lang="en-US" sz="2400" dirty="0">
+              <a:latin typeface="+mj-lt"/>
+            </a:endParaRPr>
+          </a:p>
+          <a:p>
+            <a:pPr>
+              <a:lnSpc>
+                <a:spcPct val="90000"/>
+              </a:lnSpc>
+              <a:spcAft>
+                <a:spcPts val="600"/>
+              </a:spcAft>
+            </a:pPr>
+            <a:r>
+              <a:rPr lang="en-US" sz="3600" dirty="0">
+                <a:latin typeface="+mj-lt"/>
+              </a:rPr>
+              <a:t>Directions</a:t>
+            </a:r>
+          </a:p>
+          <a:p>
+            <a:pPr marL="342900" lvl="0" indent="-342900">
+              <a:buFont typeface="Arial" panose="020B0604020202020204" pitchFamily="34" charset="0"/>
+              <a:buChar char="•"/>
+            </a:pPr>
+            <a:r>
+              <a:rPr lang="en-US" sz="2000" dirty="0">
+                <a:latin typeface="Segoe UI Semilight" panose="020B0402040204020203" pitchFamily="34" charset="0"/>
+                <a:cs typeface="Segoe UI Semilight" panose="020B0402040204020203" pitchFamily="34" charset="0"/>
+              </a:rPr>
+              <a:t>Pair with another table.</a:t>
+            </a:r>
+          </a:p>
+          <a:p>
+            <a:pPr marL="342900" lvl="0" indent="-342900">
+              <a:buFont typeface="Arial" panose="020B0604020202020204" pitchFamily="34" charset="0"/>
+              <a:buChar char="•"/>
+            </a:pPr>
+            <a:r>
+              <a:rPr lang="en-US" sz="2000" dirty="0">
+                <a:latin typeface="Segoe UI Semilight" panose="020B0402040204020203" pitchFamily="34" charset="0"/>
+                <a:cs typeface="Segoe UI Semilight" panose="020B0402040204020203" pitchFamily="34" charset="0"/>
+              </a:rPr>
+              <a:t>One table is the Microsoft team and the other table is the customer.</a:t>
+            </a:r>
+          </a:p>
+          <a:p>
+            <a:pPr marL="342900" lvl="0" indent="-342900">
+              <a:buFont typeface="Arial" panose="020B0604020202020204" pitchFamily="34" charset="0"/>
+              <a:buChar char="•"/>
+            </a:pPr>
+            <a:r>
+              <a:rPr lang="en-US" sz="2000" dirty="0">
+                <a:latin typeface="Segoe UI Semilight" panose="020B0402040204020203" pitchFamily="34" charset="0"/>
+                <a:cs typeface="Segoe UI Semilight" panose="020B0402040204020203" pitchFamily="34" charset="0"/>
+              </a:rPr>
+              <a:t>The Microsoft team presents their proposed solution to the customer.</a:t>
+            </a:r>
+          </a:p>
+          <a:p>
+            <a:pPr marL="342900" lvl="0" indent="-342900">
+              <a:buFont typeface="Arial" panose="020B0604020202020204" pitchFamily="34" charset="0"/>
+              <a:buChar char="•"/>
+            </a:pPr>
+            <a:r>
+              <a:rPr lang="en-US" sz="2000" dirty="0">
+                <a:latin typeface="Segoe UI Semilight" panose="020B0402040204020203" pitchFamily="34" charset="0"/>
+                <a:cs typeface="Segoe UI Semilight" panose="020B0402040204020203" pitchFamily="34" charset="0"/>
+              </a:rPr>
+              <a:t>The customer asks one of the objections from the list of objections in the case study.</a:t>
+            </a:r>
+          </a:p>
+          <a:p>
+            <a:pPr marL="342900" lvl="0" indent="-342900">
+              <a:buFont typeface="Arial" panose="020B0604020202020204" pitchFamily="34" charset="0"/>
+              <a:buChar char="•"/>
+            </a:pPr>
+            <a:r>
+              <a:rPr lang="en-US" sz="2000" dirty="0">
+                <a:latin typeface="Segoe UI Semilight" panose="020B0402040204020203" pitchFamily="34" charset="0"/>
+                <a:cs typeface="Segoe UI Semilight" panose="020B0402040204020203" pitchFamily="34" charset="0"/>
+              </a:rPr>
+              <a:t>The Microsoft team responds to the objection.</a:t>
+            </a:r>
+          </a:p>
+          <a:p>
+            <a:pPr marL="342900" lvl="0" indent="-342900">
+              <a:buFont typeface="Arial" panose="020B0604020202020204" pitchFamily="34" charset="0"/>
+              <a:buChar char="•"/>
+            </a:pPr>
+            <a:r>
+              <a:rPr lang="en-US" sz="2000" dirty="0">
+                <a:latin typeface="Segoe UI Semilight" panose="020B0402040204020203" pitchFamily="34" charset="0"/>
+                <a:cs typeface="Segoe UI Semilight" panose="020B0402040204020203" pitchFamily="34" charset="0"/>
+              </a:rPr>
+              <a:t>The customer team gives feedback to the Microsoft team.</a:t>
+            </a:r>
+            <a:endParaRPr lang="en-US" sz="2000" strike="sngStrike" dirty="0">
+              <a:latin typeface="Segoe UI Semilight" panose="020B0402040204020203" pitchFamily="34" charset="0"/>
+              <a:cs typeface="Segoe UI Semilight" panose="020B0402040204020203" pitchFamily="34" charset="0"/>
+            </a:endParaRPr>
+          </a:p>
+          <a:p>
+            <a:pPr>
+              <a:lnSpc>
+                <a:spcPct val="90000"/>
+              </a:lnSpc>
+              <a:spcAft>
+                <a:spcPts val="600"/>
+              </a:spcAft>
+            </a:pPr>
+            <a:endParaRPr lang="en-US" sz="2400" dirty="0">
+              <a:latin typeface="Segoe UI Semilight" panose="020B0402040204020203" pitchFamily="34" charset="0"/>
+              <a:cs typeface="Segoe UI Semilight" panose="020B0402040204020203" pitchFamily="34" charset="0"/>
+            </a:endParaRPr>
           </a:p>
         </p:txBody>
       </p:sp>
-      <p:graphicFrame>
-        <p:nvGraphicFramePr>
-          <p:cNvPr id="4" name="Table 3">
-            <a:extLst>
-              <a:ext uri="{FF2B5EF4-FFF2-40B4-BE49-F238E27FC236}">
-                <a16:creationId xmlns:a16="http://schemas.microsoft.com/office/drawing/2014/main" id="{9FC7A5CD-D651-4072-A920-34F54BCBC3EF}"/>
-              </a:ext>
-            </a:extLst>
-          </p:cNvPr>
-          <p:cNvGraphicFramePr>
-            <a:graphicFrameLocks noGrp="1"/>
-          </p:cNvGraphicFramePr>
-          <p:nvPr>
-            <p:extLst>
-              <p:ext uri="{D42A27DB-BD31-4B8C-83A1-F6EECF244321}">
-                <p14:modId xmlns:p14="http://schemas.microsoft.com/office/powerpoint/2010/main" val="204715863"/>
-              </p:ext>
-            </p:extLst>
-          </p:nvPr>
-        </p:nvGraphicFramePr>
-        <p:xfrm>
-          <a:off x="3095545" y="3791921"/>
-          <a:ext cx="8040154" cy="2600650"/>
-        </p:xfrm>
-        <a:graphic>
-          <a:graphicData uri="http://schemas.openxmlformats.org/drawingml/2006/table">
-            <a:tbl>
-              <a:tblPr firstRow="1" bandRow="1">
-                <a:tableStyleId>{69CF1AB2-1976-4502-BF36-3FF5EA218861}</a:tableStyleId>
-              </a:tblPr>
-              <a:tblGrid>
-                <a:gridCol w="1758700">
-                  <a:extLst>
-                    <a:ext uri="{9D8B030D-6E8A-4147-A177-3AD203B41FA5}">
-                      <a16:colId xmlns:a16="http://schemas.microsoft.com/office/drawing/2014/main" val="20000"/>
-                    </a:ext>
-                  </a:extLst>
-                </a:gridCol>
-                <a:gridCol w="6281454">
-                  <a:extLst>
-                    <a:ext uri="{9D8B030D-6E8A-4147-A177-3AD203B41FA5}">
-                      <a16:colId xmlns:a16="http://schemas.microsoft.com/office/drawing/2014/main" val="20001"/>
-                    </a:ext>
-                  </a:extLst>
-                </a:gridCol>
-              </a:tblGrid>
-              <a:tr h="672348">
-                <a:tc>
-                  <a:txBody>
-                    <a:bodyPr/>
-                    <a:lstStyle/>
-                    <a:p>
-                      <a:r>
-                        <a:rPr lang="en-US" sz="1300" b="1" i="1" dirty="0">
-                          <a:latin typeface="Segoe UI" panose="020B0502040204020203" pitchFamily="34" charset="0"/>
-                          <a:cs typeface="Segoe UI" panose="020B0502040204020203" pitchFamily="34" charset="0"/>
-                        </a:rPr>
-                        <a:t>Business</a:t>
-                      </a:r>
-                      <a:r>
-                        <a:rPr lang="en-US" sz="1300" b="1" i="1" kern="1200" dirty="0">
-                          <a:solidFill>
-                            <a:schemeClr val="dk1"/>
-                          </a:solidFill>
-                          <a:latin typeface="Segoe UI" panose="020B0502040204020203" pitchFamily="34" charset="0"/>
-                          <a:ea typeface="+mn-ea"/>
-                          <a:cs typeface="Segoe UI" panose="020B0502040204020203" pitchFamily="34" charset="0"/>
-                        </a:rPr>
-                        <a:t> needs</a:t>
-                      </a:r>
-                    </a:p>
-                    <a:p>
-                      <a:r>
-                        <a:rPr lang="en-US" sz="1300" b="0" i="0" dirty="0">
-                          <a:latin typeface="Segoe UI" panose="020B0502040204020203" pitchFamily="34" charset="0"/>
-                          <a:cs typeface="Segoe UI" panose="020B0502040204020203" pitchFamily="34" charset="0"/>
-                        </a:rPr>
-                        <a:t>(5 minutes)</a:t>
-                      </a:r>
-                      <a:br>
-                        <a:rPr lang="en-US" sz="1300" b="0" i="0" dirty="0">
-                          <a:latin typeface="Segoe UI" panose="020B0502040204020203" pitchFamily="34" charset="0"/>
-                          <a:cs typeface="Segoe UI" panose="020B0502040204020203" pitchFamily="34" charset="0"/>
-                        </a:rPr>
-                      </a:br>
-                      <a:endParaRPr lang="en-US" sz="1300" b="0" i="0" dirty="0">
-                        <a:latin typeface="Segoe UI" panose="020B0502040204020203" pitchFamily="34" charset="0"/>
-                        <a:cs typeface="Segoe UI" panose="020B0502040204020203" pitchFamily="34" charset="0"/>
-                      </a:endParaRPr>
-                    </a:p>
-                  </a:txBody>
-                  <a:tcPr marL="67235" marR="67235" marT="33617" marB="33617"/>
-                </a:tc>
-                <a:tc>
-                  <a:txBody>
-                    <a:bodyPr/>
-                    <a:lstStyle/>
-                    <a:p>
-                      <a:pPr marL="285750" marR="0" indent="-285750" algn="l" defTabSz="932742" rtl="0" eaLnBrk="1" fontAlgn="auto" latinLnBrk="0" hangingPunct="1">
-                        <a:lnSpc>
-                          <a:spcPct val="100000"/>
-                        </a:lnSpc>
-                        <a:spcBef>
-                          <a:spcPts val="0"/>
-                        </a:spcBef>
-                        <a:spcAft>
-                          <a:spcPts val="0"/>
-                        </a:spcAft>
-                        <a:buClrTx/>
-                        <a:buSzTx/>
-                        <a:buFont typeface="Arial" panose="020B0604020202020204" pitchFamily="34" charset="0"/>
-                        <a:buChar char="•"/>
-                        <a:tabLst/>
-                        <a:defRPr/>
-                      </a:pPr>
-                      <a:r>
-                        <a:rPr lang="en-US" sz="1300" b="0" dirty="0">
-                          <a:solidFill>
-                            <a:schemeClr val="bg1"/>
-                          </a:solidFill>
-                          <a:latin typeface="Segoe UI" panose="020B0502040204020203" pitchFamily="34" charset="0"/>
-                          <a:cs typeface="Segoe UI" panose="020B0502040204020203" pitchFamily="34" charset="0"/>
-                        </a:rPr>
-                        <a:t>Identify future options for existing resources that are in use today that could be augmented or replaced.</a:t>
-                      </a:r>
-                    </a:p>
-                    <a:p>
-                      <a:endParaRPr lang="en-US" sz="1300" b="0" dirty="0">
-                        <a:latin typeface="Segoe UI" panose="020B0502040204020203" pitchFamily="34" charset="0"/>
-                        <a:cs typeface="Segoe UI" panose="020B0502040204020203" pitchFamily="34" charset="0"/>
-                      </a:endParaRPr>
-                    </a:p>
-                  </a:txBody>
-                  <a:tcPr marL="67235" marR="67235" marT="33617" marB="33617"/>
-                </a:tc>
-                <a:extLst>
-                  <a:ext uri="{0D108BD9-81ED-4DB2-BD59-A6C34878D82A}">
-                    <a16:rowId xmlns:a16="http://schemas.microsoft.com/office/drawing/2014/main" val="10000"/>
-                  </a:ext>
-                </a:extLst>
-              </a:tr>
-              <a:tr h="672348">
-                <a:tc>
-                  <a:txBody>
-                    <a:bodyPr/>
-                    <a:lstStyle/>
-                    <a:p>
-                      <a:r>
-                        <a:rPr lang="en-US" sz="1300" b="1" i="1" dirty="0">
-                          <a:latin typeface="Segoe UI" panose="020B0502040204020203" pitchFamily="34" charset="0"/>
-                          <a:cs typeface="Segoe UI" panose="020B0502040204020203" pitchFamily="34" charset="0"/>
-                        </a:rPr>
-                        <a:t>Design</a:t>
-                      </a:r>
-                    </a:p>
-                    <a:p>
-                      <a:pPr marL="0" algn="l" defTabSz="932742" rtl="0" eaLnBrk="1" latinLnBrk="0" hangingPunct="1"/>
-                      <a:r>
-                        <a:rPr lang="en-US" sz="1300" b="0" i="0" kern="1200" dirty="0">
-                          <a:solidFill>
-                            <a:schemeClr val="dk1"/>
-                          </a:solidFill>
-                          <a:latin typeface="Segoe UI" panose="020B0502040204020203" pitchFamily="34" charset="0"/>
-                          <a:ea typeface="+mn-ea"/>
-                          <a:cs typeface="Segoe UI" panose="020B0502040204020203" pitchFamily="34" charset="0"/>
-                        </a:rPr>
-                        <a:t>(15 minutes)</a:t>
-                      </a:r>
-                      <a:br>
-                        <a:rPr lang="en-US" sz="1300" b="0" i="0" kern="1200" dirty="0">
-                          <a:solidFill>
-                            <a:schemeClr val="dk1"/>
-                          </a:solidFill>
-                          <a:latin typeface="Segoe UI" panose="020B0502040204020203" pitchFamily="34" charset="0"/>
-                          <a:ea typeface="+mn-ea"/>
-                          <a:cs typeface="Segoe UI" panose="020B0502040204020203" pitchFamily="34" charset="0"/>
-                        </a:rPr>
-                      </a:br>
-                      <a:endParaRPr lang="en-US" sz="1300" b="0" i="0" kern="1200" dirty="0">
-                        <a:solidFill>
-                          <a:schemeClr val="dk1"/>
-                        </a:solidFill>
-                        <a:latin typeface="Segoe UI" panose="020B0502040204020203" pitchFamily="34" charset="0"/>
-                        <a:ea typeface="+mn-ea"/>
-                        <a:cs typeface="Segoe UI" panose="020B0502040204020203" pitchFamily="34" charset="0"/>
-                      </a:endParaRPr>
-                    </a:p>
-                  </a:txBody>
-                  <a:tcPr marL="67235" marR="67235" marT="33617" marB="33617"/>
-                </a:tc>
-                <a:tc>
-                  <a:txBody>
-                    <a:bodyPr/>
-                    <a:lstStyle/>
-                    <a:p>
-                      <a:pPr marL="285750" marR="0" indent="-285750" algn="l" defTabSz="932742" rtl="0" eaLnBrk="1" fontAlgn="auto" latinLnBrk="0" hangingPunct="1">
-                        <a:lnSpc>
-                          <a:spcPct val="100000"/>
-                        </a:lnSpc>
-                        <a:spcBef>
-                          <a:spcPts val="0"/>
-                        </a:spcBef>
-                        <a:spcAft>
-                          <a:spcPts val="0"/>
-                        </a:spcAft>
-                        <a:buClrTx/>
-                        <a:buSzTx/>
-                        <a:buFont typeface="Arial" panose="020B0604020202020204" pitchFamily="34" charset="0"/>
-                        <a:buChar char="•"/>
-                        <a:tabLst/>
-                        <a:defRPr/>
-                      </a:pPr>
-                      <a:r>
-                        <a:rPr lang="en-US" sz="1300" kern="1200" baseline="0" dirty="0">
-                          <a:solidFill>
-                            <a:schemeClr val="bg1"/>
-                          </a:solidFill>
-                          <a:latin typeface="Segoe UI" panose="020B0502040204020203" pitchFamily="34" charset="0"/>
-                          <a:ea typeface="+mn-ea"/>
-                          <a:cs typeface="Segoe UI" panose="020B0502040204020203" pitchFamily="34" charset="0"/>
-                        </a:rPr>
-                        <a:t>Design a solution for as many of the services as time allows. Show the solution on a flipchart</a:t>
-                      </a:r>
-                    </a:p>
-                    <a:p>
-                      <a:endParaRPr lang="en-US" sz="1300" dirty="0">
-                        <a:latin typeface="Segoe UI" panose="020B0502040204020203" pitchFamily="34" charset="0"/>
-                        <a:cs typeface="Segoe UI" panose="020B0502040204020203" pitchFamily="34" charset="0"/>
-                      </a:endParaRPr>
-                    </a:p>
-                  </a:txBody>
-                  <a:tcPr marL="67235" marR="67235" marT="33617" marB="33617"/>
-                </a:tc>
-                <a:extLst>
-                  <a:ext uri="{0D108BD9-81ED-4DB2-BD59-A6C34878D82A}">
-                    <a16:rowId xmlns:a16="http://schemas.microsoft.com/office/drawing/2014/main" val="10001"/>
-                  </a:ext>
-                </a:extLst>
-              </a:tr>
-              <a:tr h="1075756">
-                <a:tc>
-                  <a:txBody>
-                    <a:bodyPr/>
-                    <a:lstStyle/>
-                    <a:p>
-                      <a:r>
-                        <a:rPr lang="en-US" sz="1300" b="1" i="1" dirty="0">
-                          <a:latin typeface="Segoe UI" panose="020B0502040204020203" pitchFamily="34" charset="0"/>
-                          <a:cs typeface="Segoe UI" panose="020B0502040204020203" pitchFamily="34" charset="0"/>
-                        </a:rPr>
-                        <a:t>Prepare</a:t>
-                      </a:r>
-                    </a:p>
-                    <a:p>
-                      <a:pPr marL="0" marR="0" indent="0" algn="l" defTabSz="932742" rtl="0" eaLnBrk="1" fontAlgn="auto" latinLnBrk="0" hangingPunct="1">
-                        <a:lnSpc>
-                          <a:spcPct val="100000"/>
-                        </a:lnSpc>
-                        <a:spcBef>
-                          <a:spcPts val="0"/>
-                        </a:spcBef>
-                        <a:spcAft>
-                          <a:spcPts val="0"/>
-                        </a:spcAft>
-                        <a:buClrTx/>
-                        <a:buSzTx/>
-                        <a:buFontTx/>
-                        <a:buNone/>
-                        <a:tabLst/>
-                        <a:defRPr/>
-                      </a:pPr>
-                      <a:r>
-                        <a:rPr lang="en-US" sz="1300" b="0" i="0" kern="1200" dirty="0">
-                          <a:solidFill>
-                            <a:schemeClr val="dk1"/>
-                          </a:solidFill>
-                          <a:latin typeface="Segoe UI" panose="020B0502040204020203" pitchFamily="34" charset="0"/>
-                          <a:ea typeface="+mn-ea"/>
-                          <a:cs typeface="Segoe UI" panose="020B0502040204020203" pitchFamily="34" charset="0"/>
-                        </a:rPr>
-                        <a:t>(10 minutes)</a:t>
-                      </a:r>
-                    </a:p>
-                    <a:p>
-                      <a:endParaRPr lang="en-US" sz="1300" b="1" i="1" dirty="0">
-                        <a:latin typeface="Segoe UI" panose="020B0502040204020203" pitchFamily="34" charset="0"/>
-                        <a:cs typeface="Segoe UI" panose="020B0502040204020203" pitchFamily="34" charset="0"/>
-                      </a:endParaRPr>
-                    </a:p>
-                  </a:txBody>
-                  <a:tcPr marL="67235" marR="67235" marT="33617" marB="33617"/>
-                </a:tc>
-                <a:tc>
-                  <a:txBody>
-                    <a:bodyPr/>
-                    <a:lstStyle/>
-                    <a:p>
-                      <a:pPr marL="285750" lvl="0" indent="-285750">
-                        <a:buFont typeface="Arial" panose="020B0604020202020204" pitchFamily="34" charset="0"/>
-                        <a:buChar char="•"/>
-                      </a:pPr>
-                      <a:r>
-                        <a:rPr lang="en-US" sz="1300" dirty="0">
-                          <a:latin typeface="Segoe UI" panose="020B0502040204020203" pitchFamily="34" charset="0"/>
-                          <a:cs typeface="Segoe UI" panose="020B0502040204020203" pitchFamily="34" charset="0"/>
-                        </a:rPr>
-                        <a:t>Identify any customer services that are not addressed with the proposed solution</a:t>
-                      </a:r>
-                    </a:p>
-                    <a:p>
-                      <a:pPr marL="285750" lvl="0" indent="-285750">
-                        <a:buFont typeface="Arial" panose="020B0604020202020204" pitchFamily="34" charset="0"/>
-                        <a:buChar char="•"/>
-                      </a:pPr>
-                      <a:r>
-                        <a:rPr lang="en-US" sz="1300" dirty="0">
-                          <a:latin typeface="Segoe UI" panose="020B0502040204020203" pitchFamily="34" charset="0"/>
-                          <a:cs typeface="Segoe UI" panose="020B0502040204020203" pitchFamily="34" charset="0"/>
-                        </a:rPr>
-                        <a:t>Identify the benefits of your solution</a:t>
-                      </a:r>
-                    </a:p>
-                    <a:p>
-                      <a:pPr marL="285750" lvl="0" indent="-285750">
-                        <a:buFont typeface="Arial" panose="020B0604020202020204" pitchFamily="34" charset="0"/>
-                        <a:buChar char="•"/>
-                      </a:pPr>
-                      <a:r>
-                        <a:rPr lang="en-US" sz="1300" dirty="0">
-                          <a:latin typeface="Segoe UI" panose="020B0502040204020203" pitchFamily="34" charset="0"/>
-                          <a:cs typeface="Segoe UI" panose="020B0502040204020203" pitchFamily="34" charset="0"/>
-                        </a:rPr>
-                        <a:t>Determine how you will respond to the customer’s objections</a:t>
-                      </a:r>
-                    </a:p>
-                    <a:p>
-                      <a:pPr marL="285750" lvl="0" indent="-285750">
-                        <a:buFont typeface="Arial" panose="020B0604020202020204" pitchFamily="34" charset="0"/>
-                        <a:buChar char="•"/>
-                      </a:pPr>
-                      <a:r>
-                        <a:rPr lang="en-US" sz="1300" dirty="0">
-                          <a:latin typeface="Segoe UI" panose="020B0502040204020203" pitchFamily="34" charset="0"/>
-                          <a:cs typeface="Segoe UI" panose="020B0502040204020203" pitchFamily="34" charset="0"/>
-                        </a:rPr>
-                        <a:t>Prepare for a 15-minute presentation to the customer</a:t>
-                      </a:r>
-                      <a:br>
-                        <a:rPr lang="en-US" sz="1300" dirty="0">
-                          <a:latin typeface="Segoe UI" panose="020B0502040204020203" pitchFamily="34" charset="0"/>
-                          <a:cs typeface="Segoe UI" panose="020B0502040204020203" pitchFamily="34" charset="0"/>
-                        </a:rPr>
-                      </a:br>
-                      <a:endParaRPr lang="en-US" sz="1300" dirty="0">
-                        <a:latin typeface="Segoe UI" panose="020B0502040204020203" pitchFamily="34" charset="0"/>
-                        <a:cs typeface="Segoe UI" panose="020B0502040204020203" pitchFamily="34" charset="0"/>
-                      </a:endParaRPr>
-                    </a:p>
-                  </a:txBody>
-                  <a:tcPr marL="67235" marR="67235" marT="33617" marB="33617"/>
-                </a:tc>
-                <a:extLst>
-                  <a:ext uri="{0D108BD9-81ED-4DB2-BD59-A6C34878D82A}">
-                    <a16:rowId xmlns:a16="http://schemas.microsoft.com/office/drawing/2014/main" val="10002"/>
-                  </a:ext>
-                </a:extLst>
-              </a:tr>
-            </a:tbl>
-          </a:graphicData>
-        </a:graphic>
-      </p:graphicFrame>
     </p:spTree>
     <p:extLst>
       <p:ext uri="{BB962C8B-B14F-4D97-AF65-F5344CB8AC3E}">
-        <p14:creationId xmlns:p14="http://schemas.microsoft.com/office/powerpoint/2010/main" val="1885082407"/>
+        <p14:creationId xmlns:p14="http://schemas.microsoft.com/office/powerpoint/2010/main" val="3717261927"/>
       </p:ext>
     </p:extLst>
   </p:cSld>
   <p:clrMapOvr>
     <a:masterClrMapping/>
   </p:clrMapOvr>
-  <mc:AlternateContent xmlns:mc="http://schemas.openxmlformats.org/markup-compatibility/2006">
-    <mc:Choice xmlns:p14="http://schemas.microsoft.com/office/powerpoint/2010/main" Requires="p14">
+  <mc:AlternateContent xmlns:mc="http://schemas.openxmlformats.org/markup-compatibility/2006" xmlns:p14="http://schemas.microsoft.com/office/powerpoint/2010/main">
+    <mc:Choice Requires="p14">
       <p:transition p14:dur="0"/>
     </mc:Choice>
-    <mc:Fallback>
+    <mc:Fallback xmlns="">
       <p:transition/>
     </mc:Fallback>
   </mc:AlternateContent>
@@ -20041,310 +19743,6 @@
                 <a:latin typeface="Segoe UI Light" panose="020B0502040204020203" pitchFamily="34" charset="0"/>
                 <a:cs typeface="Segoe UI Light" panose="020B0502040204020203" pitchFamily="34" charset="0"/>
               </a:rPr>
-              <a:t>Step 4: Present the solution</a:t>
-            </a:r>
-          </a:p>
-        </p:txBody>
-      </p:sp>
-      <p:sp>
-        <p:nvSpPr>
-          <p:cNvPr id="9" name="TextBox 8">
-            <a:extLst>
-              <a:ext uri="{FF2B5EF4-FFF2-40B4-BE49-F238E27FC236}">
-                <a16:creationId xmlns:a16="http://schemas.microsoft.com/office/drawing/2014/main" id="{0F86F9F9-39B5-4CE6-AF48-9ADAE40EA728}"/>
-              </a:ext>
-            </a:extLst>
-          </p:cNvPr>
-          <p:cNvSpPr txBox="1"/>
-          <p:nvPr/>
-        </p:nvSpPr>
-        <p:spPr>
-          <a:xfrm>
-            <a:off x="340285" y="1062166"/>
-            <a:ext cx="10229103" cy="5838521"/>
-          </a:xfrm>
-          <a:prstGeom prst="rect">
-            <a:avLst/>
-          </a:prstGeom>
-          <a:noFill/>
-        </p:spPr>
-        <p:txBody>
-          <a:bodyPr wrap="square" lIns="182880" tIns="146304" rIns="182880" bIns="146304" rtlCol="0">
-            <a:spAutoFit/>
-          </a:bodyPr>
-          <a:lstStyle/>
-          <a:p>
-            <a:pPr>
-              <a:lnSpc>
-                <a:spcPct val="90000"/>
-              </a:lnSpc>
-              <a:spcAft>
-                <a:spcPts val="600"/>
-              </a:spcAft>
-            </a:pPr>
-            <a:r>
-              <a:rPr lang="en-US" sz="3600" dirty="0">
-                <a:latin typeface="+mj-lt"/>
-              </a:rPr>
-              <a:t>Outcome</a:t>
-            </a:r>
-          </a:p>
-          <a:p>
-            <a:pPr>
-              <a:lnSpc>
-                <a:spcPct val="90000"/>
-              </a:lnSpc>
-              <a:spcAft>
-                <a:spcPts val="600"/>
-              </a:spcAft>
-            </a:pPr>
-            <a:r>
-              <a:rPr lang="en-US" sz="2400" dirty="0">
-                <a:latin typeface="Segoe UI Semilight" panose="020B0402040204020203" pitchFamily="34" charset="0"/>
-                <a:cs typeface="Segoe UI Semilight" panose="020B0402040204020203" pitchFamily="34" charset="0"/>
-              </a:rPr>
-              <a:t>Present a solution to the target customer in a 15-minute chalk-talk format. </a:t>
-            </a:r>
-            <a:endParaRPr lang="en-US" sz="3600" dirty="0">
-              <a:latin typeface="+mj-lt"/>
-            </a:endParaRPr>
-          </a:p>
-          <a:p>
-            <a:pPr>
-              <a:lnSpc>
-                <a:spcPct val="90000"/>
-              </a:lnSpc>
-              <a:spcAft>
-                <a:spcPts val="600"/>
-              </a:spcAft>
-            </a:pPr>
-            <a:endParaRPr lang="en-US" sz="2400" dirty="0">
-              <a:latin typeface="+mj-lt"/>
-            </a:endParaRPr>
-          </a:p>
-          <a:p>
-            <a:pPr>
-              <a:lnSpc>
-                <a:spcPct val="90000"/>
-              </a:lnSpc>
-              <a:spcAft>
-                <a:spcPts val="600"/>
-              </a:spcAft>
-            </a:pPr>
-            <a:r>
-              <a:rPr lang="en-US" sz="3600" dirty="0">
-                <a:latin typeface="+mj-lt"/>
-              </a:rPr>
-              <a:t>Timeframe</a:t>
-            </a:r>
-          </a:p>
-          <a:p>
-            <a:pPr>
-              <a:lnSpc>
-                <a:spcPct val="90000"/>
-              </a:lnSpc>
-              <a:spcAft>
-                <a:spcPts val="600"/>
-              </a:spcAft>
-            </a:pPr>
-            <a:r>
-              <a:rPr lang="en-US" sz="2400" dirty="0">
-                <a:latin typeface="Segoe UI Semilight" panose="020B0402040204020203" pitchFamily="34" charset="0"/>
-                <a:cs typeface="Segoe UI Semilight" panose="020B0402040204020203" pitchFamily="34" charset="0"/>
-              </a:rPr>
-              <a:t>30 minutes (15 minutes for each team to present and receive feedback) </a:t>
-            </a:r>
-          </a:p>
-          <a:p>
-            <a:pPr>
-              <a:lnSpc>
-                <a:spcPct val="90000"/>
-              </a:lnSpc>
-              <a:spcAft>
-                <a:spcPts val="600"/>
-              </a:spcAft>
-            </a:pPr>
-            <a:endParaRPr lang="en-US" sz="2400" dirty="0">
-              <a:latin typeface="+mj-lt"/>
-            </a:endParaRPr>
-          </a:p>
-          <a:p>
-            <a:pPr>
-              <a:lnSpc>
-                <a:spcPct val="90000"/>
-              </a:lnSpc>
-              <a:spcAft>
-                <a:spcPts val="600"/>
-              </a:spcAft>
-            </a:pPr>
-            <a:r>
-              <a:rPr lang="en-US" sz="3600" dirty="0">
-                <a:latin typeface="+mj-lt"/>
-              </a:rPr>
-              <a:t>Directions</a:t>
-            </a:r>
-          </a:p>
-          <a:p>
-            <a:pPr marL="342900" lvl="0" indent="-342900">
-              <a:buFont typeface="Arial" panose="020B0604020202020204" pitchFamily="34" charset="0"/>
-              <a:buChar char="•"/>
-            </a:pPr>
-            <a:r>
-              <a:rPr lang="en-US" sz="2000" dirty="0">
-                <a:latin typeface="Segoe UI Semilight" panose="020B0402040204020203" pitchFamily="34" charset="0"/>
-                <a:cs typeface="Segoe UI Semilight" panose="020B0402040204020203" pitchFamily="34" charset="0"/>
-              </a:rPr>
-              <a:t>Pair with another table.</a:t>
-            </a:r>
-          </a:p>
-          <a:p>
-            <a:pPr marL="342900" lvl="0" indent="-342900">
-              <a:buFont typeface="Arial" panose="020B0604020202020204" pitchFamily="34" charset="0"/>
-              <a:buChar char="•"/>
-            </a:pPr>
-            <a:r>
-              <a:rPr lang="en-US" sz="2000" dirty="0">
-                <a:latin typeface="Segoe UI Semilight" panose="020B0402040204020203" pitchFamily="34" charset="0"/>
-                <a:cs typeface="Segoe UI Semilight" panose="020B0402040204020203" pitchFamily="34" charset="0"/>
-              </a:rPr>
-              <a:t>One table is the Microsoft team and the other table is the customer.</a:t>
-            </a:r>
-          </a:p>
-          <a:p>
-            <a:pPr marL="342900" lvl="0" indent="-342900">
-              <a:buFont typeface="Arial" panose="020B0604020202020204" pitchFamily="34" charset="0"/>
-              <a:buChar char="•"/>
-            </a:pPr>
-            <a:r>
-              <a:rPr lang="en-US" sz="2000" dirty="0">
-                <a:latin typeface="Segoe UI Semilight" panose="020B0402040204020203" pitchFamily="34" charset="0"/>
-                <a:cs typeface="Segoe UI Semilight" panose="020B0402040204020203" pitchFamily="34" charset="0"/>
-              </a:rPr>
-              <a:t>The Microsoft team presents their proposed solution to the customer.</a:t>
-            </a:r>
-          </a:p>
-          <a:p>
-            <a:pPr marL="342900" lvl="0" indent="-342900">
-              <a:buFont typeface="Arial" panose="020B0604020202020204" pitchFamily="34" charset="0"/>
-              <a:buChar char="•"/>
-            </a:pPr>
-            <a:r>
-              <a:rPr lang="en-US" sz="2000" dirty="0">
-                <a:latin typeface="Segoe UI Semilight" panose="020B0402040204020203" pitchFamily="34" charset="0"/>
-                <a:cs typeface="Segoe UI Semilight" panose="020B0402040204020203" pitchFamily="34" charset="0"/>
-              </a:rPr>
-              <a:t>The customer asks one of the objections from the list of objections in the case study.</a:t>
-            </a:r>
-          </a:p>
-          <a:p>
-            <a:pPr marL="342900" lvl="0" indent="-342900">
-              <a:buFont typeface="Arial" panose="020B0604020202020204" pitchFamily="34" charset="0"/>
-              <a:buChar char="•"/>
-            </a:pPr>
-            <a:r>
-              <a:rPr lang="en-US" sz="2000" dirty="0">
-                <a:latin typeface="Segoe UI Semilight" panose="020B0402040204020203" pitchFamily="34" charset="0"/>
-                <a:cs typeface="Segoe UI Semilight" panose="020B0402040204020203" pitchFamily="34" charset="0"/>
-              </a:rPr>
-              <a:t>The Microsoft team responds to the objection.</a:t>
-            </a:r>
-          </a:p>
-          <a:p>
-            <a:pPr marL="342900" lvl="0" indent="-342900">
-              <a:buFont typeface="Arial" panose="020B0604020202020204" pitchFamily="34" charset="0"/>
-              <a:buChar char="•"/>
-            </a:pPr>
-            <a:r>
-              <a:rPr lang="en-US" sz="2000" dirty="0">
-                <a:latin typeface="Segoe UI Semilight" panose="020B0402040204020203" pitchFamily="34" charset="0"/>
-                <a:cs typeface="Segoe UI Semilight" panose="020B0402040204020203" pitchFamily="34" charset="0"/>
-              </a:rPr>
-              <a:t>The customer team gives feedback to the Microsoft team.</a:t>
-            </a:r>
-            <a:endParaRPr lang="en-US" sz="2000" strike="sngStrike" dirty="0">
-              <a:latin typeface="Segoe UI Semilight" panose="020B0402040204020203" pitchFamily="34" charset="0"/>
-              <a:cs typeface="Segoe UI Semilight" panose="020B0402040204020203" pitchFamily="34" charset="0"/>
-            </a:endParaRPr>
-          </a:p>
-          <a:p>
-            <a:pPr>
-              <a:lnSpc>
-                <a:spcPct val="90000"/>
-              </a:lnSpc>
-              <a:spcAft>
-                <a:spcPts val="600"/>
-              </a:spcAft>
-            </a:pPr>
-            <a:endParaRPr lang="en-US" sz="2400" dirty="0">
-              <a:latin typeface="Segoe UI Semilight" panose="020B0402040204020203" pitchFamily="34" charset="0"/>
-              <a:cs typeface="Segoe UI Semilight" panose="020B0402040204020203" pitchFamily="34" charset="0"/>
-            </a:endParaRPr>
-          </a:p>
-        </p:txBody>
-      </p:sp>
-    </p:spTree>
-    <p:extLst>
-      <p:ext uri="{BB962C8B-B14F-4D97-AF65-F5344CB8AC3E}">
-        <p14:creationId xmlns:p14="http://schemas.microsoft.com/office/powerpoint/2010/main" val="3717261927"/>
-      </p:ext>
-    </p:extLst>
-  </p:cSld>
-  <p:clrMapOvr>
-    <a:masterClrMapping/>
-  </p:clrMapOvr>
-  <mc:AlternateContent xmlns:mc="http://schemas.openxmlformats.org/markup-compatibility/2006" xmlns:p14="http://schemas.microsoft.com/office/powerpoint/2010/main">
-    <mc:Choice Requires="p14">
-      <p:transition p14:dur="0"/>
-    </mc:Choice>
-    <mc:Fallback xmlns="">
-      <p:transition/>
-    </mc:Fallback>
-  </mc:AlternateContent>
-</p:sld>
-</file>
-
-<file path=ppt/slides/slide17.xml><?xml version="1.0" encoding="utf-8"?>
-<p:sld xmlns:a="http://schemas.openxmlformats.org/drawingml/2006/main" xmlns:r="http://schemas.openxmlformats.org/officeDocument/2006/relationships" xmlns:p="http://schemas.openxmlformats.org/presentationml/2006/main">
-  <p:cSld>
-    <p:spTree>
-      <p:nvGrpSpPr>
-        <p:cNvPr id="1" name=""/>
-        <p:cNvGrpSpPr/>
-        <p:nvPr/>
-      </p:nvGrpSpPr>
-      <p:grpSpPr>
-        <a:xfrm>
-          <a:off x="0" y="0"/>
-          <a:ext cx="0" cy="0"/>
-          <a:chOff x="0" y="0"/>
-          <a:chExt cx="0" cy="0"/>
-        </a:xfrm>
-      </p:grpSpPr>
-      <p:sp>
-        <p:nvSpPr>
-          <p:cNvPr id="2" name="Title 1"/>
-          <p:cNvSpPr>
-            <a:spLocks noGrp="1"/>
-          </p:cNvSpPr>
-          <p:nvPr>
-            <p:ph type="title"/>
-          </p:nvPr>
-        </p:nvSpPr>
-        <p:spPr/>
-        <p:txBody>
-          <a:bodyPr>
-            <a:normAutofit/>
-          </a:bodyPr>
-          <a:lstStyle/>
-          <a:p>
-            <a:r>
-              <a:rPr lang="en-US" sz="4400" dirty="0">
-                <a:solidFill>
-                  <a:schemeClr val="tx1"/>
-                </a:solidFill>
-                <a:latin typeface="Segoe UI Light" panose="020B0502040204020203" pitchFamily="34" charset="0"/>
-                <a:cs typeface="Segoe UI Light" panose="020B0502040204020203" pitchFamily="34" charset="0"/>
-              </a:rPr>
               <a:t>Wrap-up</a:t>
             </a:r>
           </a:p>
@@ -20494,7 +19892,7 @@
 </p:sld>
 </file>
 
-<file path=ppt/slides/slide18.xml><?xml version="1.0" encoding="utf-8"?>
+<file path=ppt/slides/slide17.xml><?xml version="1.0" encoding="utf-8"?>
 <p:sld xmlns:a="http://schemas.openxmlformats.org/drawingml/2006/main" xmlns:r="http://schemas.openxmlformats.org/officeDocument/2006/relationships" xmlns:p="http://schemas.openxmlformats.org/presentationml/2006/main">
   <p:cSld>
     <p:bg>
@@ -20635,7 +20033,7 @@
 </p:sld>
 </file>
 
-<file path=ppt/slides/slide19.xml><?xml version="1.0" encoding="utf-8"?>
+<file path=ppt/slides/slide18.xml><?xml version="1.0" encoding="utf-8"?>
 <p:sld xmlns:a="http://schemas.openxmlformats.org/drawingml/2006/main" xmlns:r="http://schemas.openxmlformats.org/officeDocument/2006/relationships" xmlns:p="http://schemas.openxmlformats.org/presentationml/2006/main">
   <p:cSld>
     <p:spTree>
@@ -20827,158 +20225,7 @@
 </p:sld>
 </file>
 
-<file path=ppt/slides/slide2.xml><?xml version="1.0" encoding="utf-8"?>
-<p:sld xmlns:a="http://schemas.openxmlformats.org/drawingml/2006/main" xmlns:r="http://schemas.openxmlformats.org/officeDocument/2006/relationships" xmlns:p="http://schemas.openxmlformats.org/presentationml/2006/main">
-  <p:cSld>
-    <p:bg>
-      <p:bgPr>
-        <a:solidFill>
-          <a:schemeClr val="bg2"/>
-        </a:solidFill>
-        <a:effectLst/>
-      </p:bgPr>
-    </p:bg>
-    <p:spTree>
-      <p:nvGrpSpPr>
-        <p:cNvPr id="1" name=""/>
-        <p:cNvGrpSpPr/>
-        <p:nvPr/>
-      </p:nvGrpSpPr>
-      <p:grpSpPr>
-        <a:xfrm>
-          <a:off x="0" y="0"/>
-          <a:ext cx="0" cy="0"/>
-          <a:chOff x="0" y="0"/>
-          <a:chExt cx="0" cy="0"/>
-        </a:xfrm>
-      </p:grpSpPr>
-      <p:sp>
-        <p:nvSpPr>
-          <p:cNvPr id="2" name="Title 1"/>
-          <p:cNvSpPr>
-            <a:spLocks noGrp="1"/>
-          </p:cNvSpPr>
-          <p:nvPr>
-            <p:ph type="title"/>
-          </p:nvPr>
-        </p:nvSpPr>
-        <p:spPr/>
-        <p:txBody>
-          <a:bodyPr>
-            <a:normAutofit/>
-          </a:bodyPr>
-          <a:lstStyle/>
-          <a:p>
-            <a:r>
-              <a:rPr lang="en-US" sz="4400" dirty="0">
-                <a:solidFill>
-                  <a:schemeClr val="tx1"/>
-                </a:solidFill>
-                <a:latin typeface="Segoe UI Light" panose="020B0502040204020203" pitchFamily="34" charset="0"/>
-                <a:cs typeface="Segoe UI Light" panose="020B0502040204020203" pitchFamily="34" charset="0"/>
-              </a:rPr>
-              <a:t>Abstract and learning objectives</a:t>
-            </a:r>
-          </a:p>
-        </p:txBody>
-      </p:sp>
-      <p:sp>
-        <p:nvSpPr>
-          <p:cNvPr id="9" name="TextBox 8">
-            <a:extLst>
-              <a:ext uri="{FF2B5EF4-FFF2-40B4-BE49-F238E27FC236}">
-                <a16:creationId xmlns:a16="http://schemas.microsoft.com/office/drawing/2014/main" id="{0F86F9F9-39B5-4CE6-AF48-9ADAE40EA728}"/>
-              </a:ext>
-            </a:extLst>
-          </p:cNvPr>
-          <p:cNvSpPr txBox="1"/>
-          <p:nvPr/>
-        </p:nvSpPr>
-        <p:spPr>
-          <a:xfrm>
-            <a:off x="340284" y="1284049"/>
-            <a:ext cx="10738023" cy="5102935"/>
-          </a:xfrm>
-          <a:prstGeom prst="rect">
-            <a:avLst/>
-          </a:prstGeom>
-          <a:noFill/>
-        </p:spPr>
-        <p:txBody>
-          <a:bodyPr wrap="square" lIns="182880" tIns="146304" rIns="182880" bIns="146304" rtlCol="0">
-            <a:spAutoFit/>
-          </a:bodyPr>
-          <a:lstStyle/>
-          <a:p>
-            <a:pPr>
-              <a:lnSpc>
-                <a:spcPct val="90000"/>
-              </a:lnSpc>
-              <a:spcAft>
-                <a:spcPts val="600"/>
-              </a:spcAft>
-            </a:pPr>
-            <a:r>
-              <a:rPr lang="en-US" sz="2800" dirty="0">
-                <a:latin typeface="+mj-lt"/>
-              </a:rPr>
-              <a:t>In this whiteboard design session, you will look at how to design an Azure migration for a heterogenous customer environment. The existing infrastructure comprises both Windows and Linux servers running on both VMWare and physical machines and includes some legacy servers. Throughout the whiteboard design session, you will look at the various options and services available to migrate heterogenous environments to Azure.</a:t>
-            </a:r>
-          </a:p>
-          <a:p>
-            <a:pPr>
-              <a:lnSpc>
-                <a:spcPct val="90000"/>
-              </a:lnSpc>
-              <a:spcAft>
-                <a:spcPts val="600"/>
-              </a:spcAft>
-            </a:pPr>
-            <a:endParaRPr lang="en-US" sz="2800" dirty="0">
-              <a:latin typeface="+mj-lt"/>
-            </a:endParaRPr>
-          </a:p>
-          <a:p>
-            <a:pPr>
-              <a:lnSpc>
-                <a:spcPct val="90000"/>
-              </a:lnSpc>
-              <a:spcAft>
-                <a:spcPts val="600"/>
-              </a:spcAft>
-            </a:pPr>
-            <a:r>
-              <a:rPr lang="en-US" sz="2800" dirty="0">
-                <a:latin typeface="+mj-lt"/>
-              </a:rPr>
-              <a:t>At the end of this workshop, you will be better able to design and implement the discovery and assessment of environments to evaluate their readiness for migrating to Azure using services including Azure Migrate and Azure Database Migration Service.</a:t>
-            </a:r>
-            <a:endParaRPr lang="en-US" dirty="0"/>
-          </a:p>
-        </p:txBody>
-      </p:sp>
-    </p:spTree>
-    <p:extLst>
-      <p:ext uri="{BB962C8B-B14F-4D97-AF65-F5344CB8AC3E}">
-        <p14:creationId xmlns:p14="http://schemas.microsoft.com/office/powerpoint/2010/main" val="772880493"/>
-      </p:ext>
-    </p:extLst>
-  </p:cSld>
-  <p:clrMapOvr>
-    <a:masterClrMapping/>
-  </p:clrMapOvr>
-  <mc:AlternateContent xmlns:mc="http://schemas.openxmlformats.org/markup-compatibility/2006" xmlns:p14="http://schemas.microsoft.com/office/powerpoint/2010/main">
-    <mc:Choice Requires="p14">
-      <p:transition p14:dur="0"/>
-    </mc:Choice>
-    <mc:Fallback xmlns="">
-      <p:transition/>
-    </mc:Fallback>
-  </mc:AlternateContent>
-</p:sld>
-</file>
-
-<file path=ppt/slides/slide20.xml><?xml version="1.0" encoding="utf-8"?>
+<file path=ppt/slides/slide19.xml><?xml version="1.0" encoding="utf-8"?>
 <p:sld xmlns:a="http://schemas.openxmlformats.org/drawingml/2006/main" xmlns:r="http://schemas.openxmlformats.org/officeDocument/2006/relationships" xmlns:p="http://schemas.openxmlformats.org/presentationml/2006/main">
   <p:cSld>
     <p:spTree>
@@ -21121,7 +20368,158 @@
 </p:sld>
 </file>
 
-<file path=ppt/slides/slide21.xml><?xml version="1.0" encoding="utf-8"?>
+<file path=ppt/slides/slide2.xml><?xml version="1.0" encoding="utf-8"?>
+<p:sld xmlns:a="http://schemas.openxmlformats.org/drawingml/2006/main" xmlns:r="http://schemas.openxmlformats.org/officeDocument/2006/relationships" xmlns:p="http://schemas.openxmlformats.org/presentationml/2006/main">
+  <p:cSld>
+    <p:bg>
+      <p:bgPr>
+        <a:solidFill>
+          <a:schemeClr val="bg2"/>
+        </a:solidFill>
+        <a:effectLst/>
+      </p:bgPr>
+    </p:bg>
+    <p:spTree>
+      <p:nvGrpSpPr>
+        <p:cNvPr id="1" name=""/>
+        <p:cNvGrpSpPr/>
+        <p:nvPr/>
+      </p:nvGrpSpPr>
+      <p:grpSpPr>
+        <a:xfrm>
+          <a:off x="0" y="0"/>
+          <a:ext cx="0" cy="0"/>
+          <a:chOff x="0" y="0"/>
+          <a:chExt cx="0" cy="0"/>
+        </a:xfrm>
+      </p:grpSpPr>
+      <p:sp>
+        <p:nvSpPr>
+          <p:cNvPr id="2" name="Title 1"/>
+          <p:cNvSpPr>
+            <a:spLocks noGrp="1"/>
+          </p:cNvSpPr>
+          <p:nvPr>
+            <p:ph type="title"/>
+          </p:nvPr>
+        </p:nvSpPr>
+        <p:spPr/>
+        <p:txBody>
+          <a:bodyPr>
+            <a:normAutofit/>
+          </a:bodyPr>
+          <a:lstStyle/>
+          <a:p>
+            <a:r>
+              <a:rPr lang="en-US" sz="4400" dirty="0">
+                <a:solidFill>
+                  <a:schemeClr val="tx1"/>
+                </a:solidFill>
+                <a:latin typeface="Segoe UI Light" panose="020B0502040204020203" pitchFamily="34" charset="0"/>
+                <a:cs typeface="Segoe UI Light" panose="020B0502040204020203" pitchFamily="34" charset="0"/>
+              </a:rPr>
+              <a:t>Abstract and learning objectives</a:t>
+            </a:r>
+          </a:p>
+        </p:txBody>
+      </p:sp>
+      <p:sp>
+        <p:nvSpPr>
+          <p:cNvPr id="9" name="TextBox 8">
+            <a:extLst>
+              <a:ext uri="{FF2B5EF4-FFF2-40B4-BE49-F238E27FC236}">
+                <a16:creationId xmlns:a16="http://schemas.microsoft.com/office/drawing/2014/main" id="{0F86F9F9-39B5-4CE6-AF48-9ADAE40EA728}"/>
+              </a:ext>
+            </a:extLst>
+          </p:cNvPr>
+          <p:cNvSpPr txBox="1"/>
+          <p:nvPr/>
+        </p:nvSpPr>
+        <p:spPr>
+          <a:xfrm>
+            <a:off x="340284" y="1284049"/>
+            <a:ext cx="10738023" cy="5102935"/>
+          </a:xfrm>
+          <a:prstGeom prst="rect">
+            <a:avLst/>
+          </a:prstGeom>
+          <a:noFill/>
+        </p:spPr>
+        <p:txBody>
+          <a:bodyPr wrap="square" lIns="182880" tIns="146304" rIns="182880" bIns="146304" rtlCol="0">
+            <a:spAutoFit/>
+          </a:bodyPr>
+          <a:lstStyle/>
+          <a:p>
+            <a:pPr>
+              <a:lnSpc>
+                <a:spcPct val="90000"/>
+              </a:lnSpc>
+              <a:spcAft>
+                <a:spcPts val="600"/>
+              </a:spcAft>
+            </a:pPr>
+            <a:r>
+              <a:rPr lang="en-US" sz="2800" dirty="0">
+                <a:latin typeface="+mj-lt"/>
+              </a:rPr>
+              <a:t>In this whiteboard design session, you will look at how to design an Azure migration for a heterogenous customer environment. The existing infrastructure comprises both Windows and Linux servers running on both VMWare and physical machines and includes some legacy servers. Throughout the whiteboard design session, you will look at the various options and services available to migrate heterogenous environments to Azure.</a:t>
+            </a:r>
+          </a:p>
+          <a:p>
+            <a:pPr>
+              <a:lnSpc>
+                <a:spcPct val="90000"/>
+              </a:lnSpc>
+              <a:spcAft>
+                <a:spcPts val="600"/>
+              </a:spcAft>
+            </a:pPr>
+            <a:endParaRPr lang="en-US" sz="2800" dirty="0">
+              <a:latin typeface="+mj-lt"/>
+            </a:endParaRPr>
+          </a:p>
+          <a:p>
+            <a:pPr>
+              <a:lnSpc>
+                <a:spcPct val="90000"/>
+              </a:lnSpc>
+              <a:spcAft>
+                <a:spcPts val="600"/>
+              </a:spcAft>
+            </a:pPr>
+            <a:r>
+              <a:rPr lang="en-US" sz="2800" dirty="0">
+                <a:latin typeface="+mj-lt"/>
+              </a:rPr>
+              <a:t>At the end of this workshop, you will be better able to design and implement the discovery and assessment of environments to evaluate their readiness for migrating to Azure using services including Azure Migrate and Azure Database Migration Service.</a:t>
+            </a:r>
+            <a:endParaRPr lang="en-US" dirty="0"/>
+          </a:p>
+        </p:txBody>
+      </p:sp>
+    </p:spTree>
+    <p:extLst>
+      <p:ext uri="{BB962C8B-B14F-4D97-AF65-F5344CB8AC3E}">
+        <p14:creationId xmlns:p14="http://schemas.microsoft.com/office/powerpoint/2010/main" val="772880493"/>
+      </p:ext>
+    </p:extLst>
+  </p:cSld>
+  <p:clrMapOvr>
+    <a:masterClrMapping/>
+  </p:clrMapOvr>
+  <mc:AlternateContent xmlns:mc="http://schemas.openxmlformats.org/markup-compatibility/2006" xmlns:p14="http://schemas.microsoft.com/office/powerpoint/2010/main">
+    <mc:Choice Requires="p14">
+      <p:transition p14:dur="0"/>
+    </mc:Choice>
+    <mc:Fallback xmlns="">
+      <p:transition/>
+    </mc:Fallback>
+  </mc:AlternateContent>
+</p:sld>
+</file>
+
+<file path=ppt/slides/slide20.xml><?xml version="1.0" encoding="utf-8"?>
 <p:sld xmlns:a="http://schemas.openxmlformats.org/drawingml/2006/main" xmlns:r="http://schemas.openxmlformats.org/officeDocument/2006/relationships" xmlns:p="http://schemas.openxmlformats.org/presentationml/2006/main">
   <p:cSld>
     <p:spTree>
@@ -21341,7 +20739,7 @@
 </p:sld>
 </file>
 
-<file path=ppt/slides/slide22.xml><?xml version="1.0" encoding="utf-8"?>
+<file path=ppt/slides/slide21.xml><?xml version="1.0" encoding="utf-8"?>
 <p:sld xmlns:a="http://schemas.openxmlformats.org/drawingml/2006/main" xmlns:r="http://schemas.openxmlformats.org/officeDocument/2006/relationships" xmlns:p="http://schemas.openxmlformats.org/presentationml/2006/main">
   <p:cSld>
     <p:spTree>
@@ -21493,7 +20891,7 @@
 </p:sld>
 </file>
 
-<file path=ppt/slides/slide23.xml><?xml version="1.0" encoding="utf-8"?>
+<file path=ppt/slides/slide22.xml><?xml version="1.0" encoding="utf-8"?>
 <p:sld xmlns:a="http://schemas.openxmlformats.org/drawingml/2006/main" xmlns:r="http://schemas.openxmlformats.org/officeDocument/2006/relationships" xmlns:p="http://schemas.openxmlformats.org/presentationml/2006/main">
   <p:cSld>
     <p:spTree>
@@ -21628,7 +21026,7 @@
 </p:sld>
 </file>
 
-<file path=ppt/slides/slide24.xml><?xml version="1.0" encoding="utf-8"?>
+<file path=ppt/slides/slide23.xml><?xml version="1.0" encoding="utf-8"?>
 <p:sld xmlns:a="http://schemas.openxmlformats.org/drawingml/2006/main" xmlns:r="http://schemas.openxmlformats.org/officeDocument/2006/relationships" xmlns:p="http://schemas.openxmlformats.org/presentationml/2006/main">
   <p:cSld>
     <p:spTree>
@@ -21817,7 +21215,7 @@
 </p:sld>
 </file>
 
-<file path=ppt/slides/slide25.xml><?xml version="1.0" encoding="utf-8"?>
+<file path=ppt/slides/slide24.xml><?xml version="1.0" encoding="utf-8"?>
 <p:sld xmlns:a="http://schemas.openxmlformats.org/drawingml/2006/main" xmlns:r="http://schemas.openxmlformats.org/officeDocument/2006/relationships" xmlns:p="http://schemas.openxmlformats.org/presentationml/2006/main">
   <p:cSld>
     <p:spTree>
@@ -21953,6 +21351,149 @@
 </p:sld>
 </file>
 
+<file path=ppt/slides/slide25.xml><?xml version="1.0" encoding="utf-8"?>
+<p:sld xmlns:a="http://schemas.openxmlformats.org/drawingml/2006/main" xmlns:r="http://schemas.openxmlformats.org/officeDocument/2006/relationships" xmlns:p="http://schemas.openxmlformats.org/presentationml/2006/main">
+  <p:cSld>
+    <p:spTree>
+      <p:nvGrpSpPr>
+        <p:cNvPr id="1" name=""/>
+        <p:cNvGrpSpPr/>
+        <p:nvPr/>
+      </p:nvGrpSpPr>
+      <p:grpSpPr>
+        <a:xfrm>
+          <a:off x="0" y="0"/>
+          <a:ext cx="0" cy="0"/>
+          <a:chOff x="0" y="0"/>
+          <a:chExt cx="0" cy="0"/>
+        </a:xfrm>
+      </p:grpSpPr>
+      <p:sp>
+        <p:nvSpPr>
+          <p:cNvPr id="2" name="Title 1">
+            <a:extLst>
+              <a:ext uri="{FF2B5EF4-FFF2-40B4-BE49-F238E27FC236}">
+                <a16:creationId xmlns:a16="http://schemas.microsoft.com/office/drawing/2014/main" id="{59C1FCCA-E72A-4D22-BB7E-034E6745E6AE}"/>
+              </a:ext>
+            </a:extLst>
+          </p:cNvPr>
+          <p:cNvSpPr>
+            <a:spLocks noGrp="1"/>
+          </p:cNvSpPr>
+          <p:nvPr>
+            <p:ph type="title"/>
+          </p:nvPr>
+        </p:nvSpPr>
+        <p:spPr/>
+        <p:txBody>
+          <a:bodyPr/>
+          <a:lstStyle/>
+          <a:p>
+            <a:r>
+              <a:rPr lang="en-IE" dirty="0"/>
+              <a:t>Solution Details: Migration</a:t>
+            </a:r>
+          </a:p>
+        </p:txBody>
+      </p:sp>
+      <p:sp>
+        <p:nvSpPr>
+          <p:cNvPr id="3" name="Text Placeholder 2">
+            <a:extLst>
+              <a:ext uri="{FF2B5EF4-FFF2-40B4-BE49-F238E27FC236}">
+                <a16:creationId xmlns:a16="http://schemas.microsoft.com/office/drawing/2014/main" id="{E62D2B87-13E1-4D84-A606-CB293B6C82B6}"/>
+              </a:ext>
+            </a:extLst>
+          </p:cNvPr>
+          <p:cNvSpPr>
+            <a:spLocks noGrp="1"/>
+          </p:cNvSpPr>
+          <p:nvPr>
+            <p:ph type="body" sz="quarter" idx="10"/>
+          </p:nvPr>
+        </p:nvSpPr>
+        <p:spPr>
+          <a:xfrm>
+            <a:off x="269239" y="1189177"/>
+            <a:ext cx="11653523" cy="5301388"/>
+          </a:xfrm>
+        </p:spPr>
+        <p:txBody>
+          <a:bodyPr/>
+          <a:lstStyle/>
+          <a:p>
+            <a:r>
+              <a:rPr lang="en-IE" dirty="0"/>
+              <a:t>Prepare Azure environment</a:t>
+            </a:r>
+          </a:p>
+          <a:p>
+            <a:pPr lvl="1"/>
+            <a:r>
+              <a:rPr lang="en-IE" dirty="0"/>
+              <a:t>Accounts, permissions, storage, network…everything except the VMs and their disks</a:t>
+            </a:r>
+          </a:p>
+          <a:p>
+            <a:pPr lvl="1"/>
+            <a:r>
+              <a:rPr lang="en-IE" dirty="0"/>
+              <a:t>Use Azure Landing Zones for best practices and reusable deployment artifacts</a:t>
+            </a:r>
+          </a:p>
+          <a:p>
+            <a:r>
+              <a:rPr lang="en-IE" dirty="0"/>
+              <a:t>Deploy on-premises components</a:t>
+            </a:r>
+          </a:p>
+          <a:p>
+            <a:pPr lvl="1"/>
+            <a:r>
+              <a:rPr lang="en-IE" dirty="0"/>
+              <a:t>VMware (agent-less): Azure migrate appliance VM; nothing to install on each VM</a:t>
+            </a:r>
+          </a:p>
+          <a:p>
+            <a:pPr lvl="1"/>
+            <a:r>
+              <a:rPr lang="en-IE" dirty="0"/>
+              <a:t>VMware (agent-based) or physical servers: Replication appliance VM or server; plus Mobility Service agent on each VM or machine to be migrated</a:t>
+            </a:r>
+          </a:p>
+          <a:p>
+            <a:r>
+              <a:rPr lang="en-IE" dirty="0"/>
+              <a:t>Configure replication policy and enable replication</a:t>
+            </a:r>
+          </a:p>
+          <a:p>
+            <a:r>
+              <a:rPr lang="en-IE" dirty="0"/>
+              <a:t>Perform test failover and verify</a:t>
+            </a:r>
+          </a:p>
+          <a:p>
+            <a:endParaRPr lang="en-IE" dirty="0"/>
+          </a:p>
+        </p:txBody>
+      </p:sp>
+    </p:spTree>
+    <p:extLst>
+      <p:ext uri="{BB962C8B-B14F-4D97-AF65-F5344CB8AC3E}">
+        <p14:creationId xmlns:p14="http://schemas.microsoft.com/office/powerpoint/2010/main" val="3410966198"/>
+      </p:ext>
+    </p:extLst>
+  </p:cSld>
+  <p:clrMapOvr>
+    <a:masterClrMapping/>
+  </p:clrMapOvr>
+  <p:transition>
+    <p:fade/>
+  </p:transition>
+</p:sld>
+</file>
+
 <file path=ppt/slides/slide26.xml><?xml version="1.0" encoding="utf-8"?>
 <p:sld xmlns:a="http://schemas.openxmlformats.org/drawingml/2006/main" xmlns:r="http://schemas.openxmlformats.org/officeDocument/2006/relationships" xmlns:p="http://schemas.openxmlformats.org/presentationml/2006/main">
   <p:cSld>
@@ -22017,7 +21558,7 @@
         <p:spPr>
           <a:xfrm>
             <a:off x="269239" y="1189177"/>
-            <a:ext cx="11653523" cy="5301388"/>
+            <a:ext cx="11653523" cy="6192208"/>
           </a:xfrm>
         </p:spPr>
         <p:txBody>
@@ -22026,53 +21567,98 @@
           <a:p>
             <a:r>
               <a:rPr lang="en-IE" dirty="0"/>
-              <a:t>Prepare Azure environment</a:t>
+              <a:t>Cut over</a:t>
             </a:r>
           </a:p>
           <a:p>
             <a:pPr lvl="1"/>
             <a:r>
+              <a:rPr lang="en-IE" sz="2400" dirty="0"/>
+              <a:t>Update application settings (connection strings, configurations, etc)</a:t>
+            </a:r>
+          </a:p>
+          <a:p>
+            <a:pPr lvl="1"/>
+            <a:r>
+              <a:rPr lang="en-IE" sz="2400" dirty="0"/>
+              <a:t>Acceptance testing</a:t>
+            </a:r>
+          </a:p>
+          <a:p>
+            <a:pPr lvl="1"/>
+            <a:r>
+              <a:rPr lang="en-IE" sz="2400" dirty="0"/>
+              <a:t>Endpoint update (typically DNS change)</a:t>
+            </a:r>
+          </a:p>
+          <a:p>
+            <a:r>
               <a:rPr lang="en-IE" dirty="0"/>
-              <a:t>Accounts, permissions, storage, network…everything except the VMs and their disks</a:t>
+              <a:t>Post-migration</a:t>
             </a:r>
           </a:p>
           <a:p>
             <a:pPr lvl="1"/>
             <a:r>
-              <a:rPr lang="en-IE" dirty="0"/>
-              <a:t>Use Azure Landing Zones for best practices and reusable deployment artifacts</a:t>
-            </a:r>
-          </a:p>
-          <a:p>
-            <a:r>
-              <a:rPr lang="en-IE" dirty="0"/>
-              <a:t>Deploy on-premises components</a:t>
+              <a:rPr lang="en-IE" sz="2400" dirty="0"/>
+              <a:t>Install VM agent / uninstall Mobility Service agent</a:t>
             </a:r>
           </a:p>
           <a:p>
             <a:pPr lvl="1"/>
             <a:r>
-              <a:rPr lang="en-IE" dirty="0"/>
-              <a:t>VMware (agent-less): Azure migrate appliance VM; nothing to install on each VM</a:t>
+              <a:rPr lang="en-IE" sz="2400" dirty="0"/>
+              <a:t>Review Azure Advisor / Security </a:t>
+            </a:r>
+            <a:r>
+              <a:rPr lang="en-IE" sz="2400" dirty="0" err="1"/>
+              <a:t>Center</a:t>
+            </a:r>
+            <a:r>
+              <a:rPr lang="en-IE" sz="2400" dirty="0"/>
+              <a:t> recommendations</a:t>
             </a:r>
           </a:p>
           <a:p>
             <a:pPr lvl="1"/>
             <a:r>
-              <a:rPr lang="en-IE" dirty="0"/>
-              <a:t>VMware (agent-based) or physical servers: Replication appliance VM or server; plus Mobility Service agent on each VM or machine to be migrated</a:t>
-            </a:r>
-          </a:p>
-          <a:p>
-            <a:r>
-              <a:rPr lang="en-IE" dirty="0"/>
-              <a:t>Configure replication policy and enable replication</a:t>
-            </a:r>
-          </a:p>
-          <a:p>
-            <a:r>
-              <a:rPr lang="en-IE" dirty="0"/>
-              <a:t>Perform test failover and verify</a:t>
+              <a:rPr lang="en-IE" sz="2400" dirty="0"/>
+              <a:t>Apply principles from the Azure Well-Architected Framework</a:t>
+            </a:r>
+          </a:p>
+          <a:p>
+            <a:pPr lvl="2"/>
+            <a:r>
+              <a:rPr lang="en-IE" sz="2008" dirty="0"/>
+              <a:t>Cost optimization (e.g. right-sizing, apply discounts, shut down in off hours)</a:t>
+            </a:r>
+          </a:p>
+          <a:p>
+            <a:pPr lvl="2"/>
+            <a:r>
+              <a:rPr lang="en-IE" sz="2008" dirty="0"/>
+              <a:t>Operational excellence (e.g. monitoring)</a:t>
+            </a:r>
+          </a:p>
+          <a:p>
+            <a:pPr lvl="2"/>
+            <a:r>
+              <a:rPr lang="en-IE" sz="2008" dirty="0"/>
+              <a:t>Performance efficiency (e.g. auto-scale)</a:t>
+            </a:r>
+          </a:p>
+          <a:p>
+            <a:pPr lvl="2"/>
+            <a:r>
+              <a:rPr lang="en-IE" sz="2008" dirty="0"/>
+              <a:t>Reliability (e.g. high availability, backup and DR)</a:t>
+            </a:r>
+          </a:p>
+          <a:p>
+            <a:pPr lvl="2"/>
+            <a:r>
+              <a:rPr lang="en-IE" sz="2008" dirty="0"/>
+              <a:t>Security (e.g. enable disk encryption, network access, Azure RBAC)</a:t>
             </a:r>
           </a:p>
           <a:p>
@@ -22083,7 +21669,7 @@
     </p:spTree>
     <p:extLst>
       <p:ext uri="{BB962C8B-B14F-4D97-AF65-F5344CB8AC3E}">
-        <p14:creationId xmlns:p14="http://schemas.microsoft.com/office/powerpoint/2010/main" val="3410966198"/>
+        <p14:creationId xmlns:p14="http://schemas.microsoft.com/office/powerpoint/2010/main" val="1314888463"/>
       </p:ext>
     </p:extLst>
   </p:cSld>
@@ -22135,194 +21721,6 @@
           <a:lstStyle/>
           <a:p>
             <a:r>
-              <a:rPr lang="en-IE" dirty="0"/>
-              <a:t>Solution Details: Migration</a:t>
-            </a:r>
-          </a:p>
-        </p:txBody>
-      </p:sp>
-      <p:sp>
-        <p:nvSpPr>
-          <p:cNvPr id="3" name="Text Placeholder 2">
-            <a:extLst>
-              <a:ext uri="{FF2B5EF4-FFF2-40B4-BE49-F238E27FC236}">
-                <a16:creationId xmlns:a16="http://schemas.microsoft.com/office/drawing/2014/main" id="{E62D2B87-13E1-4D84-A606-CB293B6C82B6}"/>
-              </a:ext>
-            </a:extLst>
-          </p:cNvPr>
-          <p:cNvSpPr>
-            <a:spLocks noGrp="1"/>
-          </p:cNvSpPr>
-          <p:nvPr>
-            <p:ph type="body" sz="quarter" idx="10"/>
-          </p:nvPr>
-        </p:nvSpPr>
-        <p:spPr>
-          <a:xfrm>
-            <a:off x="269239" y="1189177"/>
-            <a:ext cx="11653523" cy="6192208"/>
-          </a:xfrm>
-        </p:spPr>
-        <p:txBody>
-          <a:bodyPr/>
-          <a:lstStyle/>
-          <a:p>
-            <a:r>
-              <a:rPr lang="en-IE" dirty="0"/>
-              <a:t>Cut over</a:t>
-            </a:r>
-          </a:p>
-          <a:p>
-            <a:pPr lvl="1"/>
-            <a:r>
-              <a:rPr lang="en-IE" sz="2400" dirty="0"/>
-              <a:t>Update application settings (connection strings, configurations, etc)</a:t>
-            </a:r>
-          </a:p>
-          <a:p>
-            <a:pPr lvl="1"/>
-            <a:r>
-              <a:rPr lang="en-IE" sz="2400" dirty="0"/>
-              <a:t>Acceptance testing</a:t>
-            </a:r>
-          </a:p>
-          <a:p>
-            <a:pPr lvl="1"/>
-            <a:r>
-              <a:rPr lang="en-IE" sz="2400" dirty="0"/>
-              <a:t>Endpoint update (typically DNS change)</a:t>
-            </a:r>
-          </a:p>
-          <a:p>
-            <a:r>
-              <a:rPr lang="en-IE" dirty="0"/>
-              <a:t>Post-migration</a:t>
-            </a:r>
-          </a:p>
-          <a:p>
-            <a:pPr lvl="1"/>
-            <a:r>
-              <a:rPr lang="en-IE" sz="2400" dirty="0"/>
-              <a:t>Install VM agent / uninstall Mobility Service agent</a:t>
-            </a:r>
-          </a:p>
-          <a:p>
-            <a:pPr lvl="1"/>
-            <a:r>
-              <a:rPr lang="en-IE" sz="2400" dirty="0"/>
-              <a:t>Review Azure Advisor / Security </a:t>
-            </a:r>
-            <a:r>
-              <a:rPr lang="en-IE" sz="2400" dirty="0" err="1"/>
-              <a:t>Center</a:t>
-            </a:r>
-            <a:r>
-              <a:rPr lang="en-IE" sz="2400" dirty="0"/>
-              <a:t> recommendations</a:t>
-            </a:r>
-          </a:p>
-          <a:p>
-            <a:pPr lvl="1"/>
-            <a:r>
-              <a:rPr lang="en-IE" sz="2400" dirty="0"/>
-              <a:t>Apply principles from the Azure Well-Architected Framework</a:t>
-            </a:r>
-          </a:p>
-          <a:p>
-            <a:pPr lvl="2"/>
-            <a:r>
-              <a:rPr lang="en-IE" sz="2008" dirty="0"/>
-              <a:t>Cost optimization (e.g. right-sizing, apply discounts, shut down in off hours)</a:t>
-            </a:r>
-          </a:p>
-          <a:p>
-            <a:pPr lvl="2"/>
-            <a:r>
-              <a:rPr lang="en-IE" sz="2008" dirty="0"/>
-              <a:t>Operational excellence (e.g. monitoring)</a:t>
-            </a:r>
-          </a:p>
-          <a:p>
-            <a:pPr lvl="2"/>
-            <a:r>
-              <a:rPr lang="en-IE" sz="2008" dirty="0"/>
-              <a:t>Performance efficiency (e.g. auto-scale)</a:t>
-            </a:r>
-          </a:p>
-          <a:p>
-            <a:pPr lvl="2"/>
-            <a:r>
-              <a:rPr lang="en-IE" sz="2008" dirty="0"/>
-              <a:t>Reliability (e.g. high availability, backup and DR)</a:t>
-            </a:r>
-          </a:p>
-          <a:p>
-            <a:pPr lvl="2"/>
-            <a:r>
-              <a:rPr lang="en-IE" sz="2008" dirty="0"/>
-              <a:t>Security (e.g. enable disk encryption, network access, Azure RBAC)</a:t>
-            </a:r>
-          </a:p>
-          <a:p>
-            <a:endParaRPr lang="en-IE" dirty="0"/>
-          </a:p>
-        </p:txBody>
-      </p:sp>
-    </p:spTree>
-    <p:extLst>
-      <p:ext uri="{BB962C8B-B14F-4D97-AF65-F5344CB8AC3E}">
-        <p14:creationId xmlns:p14="http://schemas.microsoft.com/office/powerpoint/2010/main" val="1314888463"/>
-      </p:ext>
-    </p:extLst>
-  </p:cSld>
-  <p:clrMapOvr>
-    <a:masterClrMapping/>
-  </p:clrMapOvr>
-  <p:transition>
-    <p:fade/>
-  </p:transition>
-</p:sld>
-</file>
-
-<file path=ppt/slides/slide28.xml><?xml version="1.0" encoding="utf-8"?>
-<p:sld xmlns:a="http://schemas.openxmlformats.org/drawingml/2006/main" xmlns:r="http://schemas.openxmlformats.org/officeDocument/2006/relationships" xmlns:p="http://schemas.openxmlformats.org/presentationml/2006/main">
-  <p:cSld>
-    <p:spTree>
-      <p:nvGrpSpPr>
-        <p:cNvPr id="1" name=""/>
-        <p:cNvGrpSpPr/>
-        <p:nvPr/>
-      </p:nvGrpSpPr>
-      <p:grpSpPr>
-        <a:xfrm>
-          <a:off x="0" y="0"/>
-          <a:ext cx="0" cy="0"/>
-          <a:chOff x="0" y="0"/>
-          <a:chExt cx="0" cy="0"/>
-        </a:xfrm>
-      </p:grpSpPr>
-      <p:sp>
-        <p:nvSpPr>
-          <p:cNvPr id="2" name="Title 1">
-            <a:extLst>
-              <a:ext uri="{FF2B5EF4-FFF2-40B4-BE49-F238E27FC236}">
-                <a16:creationId xmlns:a16="http://schemas.microsoft.com/office/drawing/2014/main" id="{59C1FCCA-E72A-4D22-BB7E-034E6745E6AE}"/>
-              </a:ext>
-            </a:extLst>
-          </p:cNvPr>
-          <p:cNvSpPr>
-            <a:spLocks noGrp="1"/>
-          </p:cNvSpPr>
-          <p:nvPr>
-            <p:ph type="title"/>
-          </p:nvPr>
-        </p:nvSpPr>
-        <p:spPr/>
-        <p:txBody>
-          <a:bodyPr/>
-          <a:lstStyle/>
-          <a:p>
-            <a:r>
               <a:rPr lang="en-IE" sz="4400" dirty="0"/>
               <a:t>Solution Details: Database Migration Service (DMS)</a:t>
             </a:r>
@@ -22439,7 +21837,7 @@
 </p:sld>
 </file>
 
-<file path=ppt/slides/slide29.xml><?xml version="1.0" encoding="utf-8"?>
+<file path=ppt/slides/slide28.xml><?xml version="1.0" encoding="utf-8"?>
 <p:sld xmlns:a="http://schemas.openxmlformats.org/drawingml/2006/main" xmlns:r="http://schemas.openxmlformats.org/officeDocument/2006/relationships" xmlns:p="http://schemas.openxmlformats.org/presentationml/2006/main">
   <p:cSld>
     <p:spTree>
@@ -22630,6 +22028,165 @@
 </p:sld>
 </file>
 
+<file path=ppt/slides/slide29.xml><?xml version="1.0" encoding="utf-8"?>
+<p:sld xmlns:a="http://schemas.openxmlformats.org/drawingml/2006/main" xmlns:r="http://schemas.openxmlformats.org/officeDocument/2006/relationships" xmlns:p="http://schemas.openxmlformats.org/presentationml/2006/main">
+  <p:cSld>
+    <p:spTree>
+      <p:nvGrpSpPr>
+        <p:cNvPr id="1" name=""/>
+        <p:cNvGrpSpPr/>
+        <p:nvPr/>
+      </p:nvGrpSpPr>
+      <p:grpSpPr>
+        <a:xfrm>
+          <a:off x="0" y="0"/>
+          <a:ext cx="0" cy="0"/>
+          <a:chOff x="0" y="0"/>
+          <a:chExt cx="0" cy="0"/>
+        </a:xfrm>
+      </p:grpSpPr>
+      <p:sp>
+        <p:nvSpPr>
+          <p:cNvPr id="2" name="Title 1"/>
+          <p:cNvSpPr>
+            <a:spLocks noGrp="1"/>
+          </p:cNvSpPr>
+          <p:nvPr>
+            <p:ph type="title"/>
+          </p:nvPr>
+        </p:nvSpPr>
+        <p:spPr/>
+        <p:txBody>
+          <a:bodyPr/>
+          <a:lstStyle/>
+          <a:p>
+            <a:r>
+              <a:rPr lang="en-US" dirty="0"/>
+              <a:t>Preferred objections handling</a:t>
+            </a:r>
+            <a:br>
+              <a:rPr lang="en-US" dirty="0"/>
+            </a:br>
+            <a:endParaRPr lang="en-US" dirty="0"/>
+          </a:p>
+        </p:txBody>
+      </p:sp>
+      <p:sp>
+        <p:nvSpPr>
+          <p:cNvPr id="3" name="Content Placeholder 2"/>
+          <p:cNvSpPr>
+            <a:spLocks noGrp="1"/>
+          </p:cNvSpPr>
+          <p:nvPr>
+            <p:ph type="body" sz="quarter" idx="10"/>
+          </p:nvPr>
+        </p:nvSpPr>
+        <p:spPr>
+          <a:xfrm>
+            <a:off x="269239" y="1189177"/>
+            <a:ext cx="11653523" cy="5946243"/>
+          </a:xfrm>
+        </p:spPr>
+        <p:txBody>
+          <a:bodyPr/>
+          <a:lstStyle/>
+          <a:p>
+            <a:r>
+              <a:rPr lang="en-US" sz="2400" dirty="0">
+                <a:latin typeface="Segoe UI Semibold" panose="020B0702040204020203" pitchFamily="34" charset="0"/>
+                <a:cs typeface="Segoe UI Semibold" panose="020B0702040204020203" pitchFamily="34" charset="0"/>
+              </a:rPr>
+              <a:t>Objection: </a:t>
+            </a:r>
+            <a:r>
+              <a:rPr lang="en-US" sz="2400" dirty="0">
+                <a:solidFill>
+                  <a:schemeClr val="tx1"/>
+                </a:solidFill>
+              </a:rPr>
+              <a:t>Owners of each business application need to approve any substantial application change, including migration. Business owners have indicated that they will require evidence that migration will be successful before granting approval.</a:t>
+            </a:r>
+          </a:p>
+          <a:p>
+            <a:endParaRPr lang="en-US" sz="2400" dirty="0"/>
+          </a:p>
+          <a:p>
+            <a:r>
+              <a:rPr lang="en-US" sz="2400" dirty="0">
+                <a:latin typeface="Segoe UI Semibold" panose="020B0702040204020203" pitchFamily="34" charset="0"/>
+                <a:cs typeface="Segoe UI Semibold" panose="020B0702040204020203" pitchFamily="34" charset="0"/>
+              </a:rPr>
+              <a:t>Answer: </a:t>
+            </a:r>
+            <a:r>
+              <a:rPr lang="en-US" sz="2400" dirty="0">
+                <a:solidFill>
+                  <a:schemeClr val="tx1"/>
+                </a:solidFill>
+              </a:rPr>
+              <a:t>Create of a proof of concept deployment, to validate the overall architecture and any assumptions, for example regarding the impact of changes to network latency between application components.</a:t>
+            </a:r>
+          </a:p>
+          <a:p>
+            <a:br>
+              <a:rPr lang="en-US" sz="2400" dirty="0">
+                <a:solidFill>
+                  <a:schemeClr val="tx1"/>
+                </a:solidFill>
+              </a:rPr>
+            </a:br>
+            <a:r>
+              <a:rPr lang="en-US" sz="2400" dirty="0">
+                <a:solidFill>
+                  <a:schemeClr val="tx1"/>
+                </a:solidFill>
+              </a:rPr>
+              <a:t>For the migration process itself, Azure Migrate supports a 'test failover'. This creates the Azure deployment in parallel with the existing deployment, allowing the migration process to be verified without risk of production impact. Likewise, database migration using DMS does not impact the existing production database.</a:t>
+            </a:r>
+          </a:p>
+          <a:p>
+            <a:endParaRPr lang="en-US" sz="2400" dirty="0">
+              <a:solidFill>
+                <a:schemeClr val="tx1"/>
+              </a:solidFill>
+            </a:endParaRPr>
+          </a:p>
+          <a:p>
+            <a:r>
+              <a:rPr lang="en-US" sz="2400" dirty="0">
+                <a:solidFill>
+                  <a:schemeClr val="tx1"/>
+                </a:solidFill>
+              </a:rPr>
+              <a:t>Third-party migration tools used for migration of physical servers similarly support a validation step prior to committing the migration.</a:t>
+            </a:r>
+          </a:p>
+          <a:p>
+            <a:endParaRPr lang="en-US" sz="2400" dirty="0"/>
+          </a:p>
+        </p:txBody>
+      </p:sp>
+    </p:spTree>
+    <p:extLst>
+      <p:ext uri="{BB962C8B-B14F-4D97-AF65-F5344CB8AC3E}">
+        <p14:creationId xmlns:p14="http://schemas.microsoft.com/office/powerpoint/2010/main" val="2923730869"/>
+      </p:ext>
+    </p:extLst>
+  </p:cSld>
+  <p:clrMapOvr>
+    <a:masterClrMapping/>
+  </p:clrMapOvr>
+  <mc:AlternateContent xmlns:mc="http://schemas.openxmlformats.org/markup-compatibility/2006" xmlns:p14="http://schemas.microsoft.com/office/powerpoint/2010/main">
+    <mc:Choice Requires="p14">
+      <p:transition p14:dur="0"/>
+    </mc:Choice>
+    <mc:Fallback xmlns="">
+      <p:transition/>
+    </mc:Fallback>
+  </mc:AlternateContent>
+</p:sld>
+</file>
+
 <file path=ppt/slides/slide3.xml><?xml version="1.0" encoding="utf-8"?>
 <p:sld xmlns:a="http://schemas.openxmlformats.org/drawingml/2006/main" xmlns:r="http://schemas.openxmlformats.org/officeDocument/2006/relationships" xmlns:p="http://schemas.openxmlformats.org/presentationml/2006/main">
   <p:cSld>
@@ -22868,7 +22425,7 @@
         <p:spPr>
           <a:xfrm>
             <a:off x="269239" y="1189177"/>
-            <a:ext cx="11653523" cy="5946243"/>
+            <a:ext cx="11653523" cy="1994392"/>
           </a:xfrm>
         </p:spPr>
         <p:txBody>
@@ -22888,7 +22445,7 @@
                   <a:schemeClr val="tx1"/>
                 </a:solidFill>
               </a:rPr>
-              <a:t>Owners of each business application need to approve any substantial application change, including migration. Business owners have indicated that they will require evidence that migration will be successful before granting approval.</a:t>
+              <a:t>Fabrikam have negotiated an Enterprise Agreement (EA) with Microsoft for their Azure consumption. Any cost estimates need to reflect their EA discount.</a:t>
             </a:r>
           </a:p>
           <a:p>
@@ -22908,44 +22465,8 @@
                   <a:schemeClr val="tx1"/>
                 </a:solidFill>
               </a:rPr>
-              <a:t>Create of a proof of concept deployment, to validate the overall architecture and any assumptions, for example regarding the impact of changes to network latency between application components.</a:t>
-            </a:r>
-          </a:p>
-          <a:p>
-            <a:br>
-              <a:rPr lang="en-US" sz="2400" dirty="0">
-                <a:solidFill>
-                  <a:schemeClr val="tx1"/>
-                </a:solidFill>
-              </a:rPr>
-            </a:br>
-            <a:r>
-              <a:rPr lang="en-US" sz="2400" dirty="0">
-                <a:solidFill>
-                  <a:schemeClr val="tx1"/>
-                </a:solidFill>
-              </a:rPr>
-              <a:t>For the migration process itself, Azure Migrate supports a 'test failover'. This creates the Azure deployment in parallel with the existing deployment, allowing the migration process to be verified without risk of production impact. Likewise, database migration using DMS does not impact the existing production database.</a:t>
-            </a:r>
-          </a:p>
-          <a:p>
-            <a:endParaRPr lang="en-US" sz="2400" dirty="0">
-              <a:solidFill>
-                <a:schemeClr val="tx1"/>
-              </a:solidFill>
-            </a:endParaRPr>
-          </a:p>
-          <a:p>
-            <a:r>
-              <a:rPr lang="en-US" sz="2400" dirty="0">
-                <a:solidFill>
-                  <a:schemeClr val="tx1"/>
-                </a:solidFill>
-              </a:rPr>
-              <a:t>Third-party migration tools used for migration of physical servers similarly support a validation step prior to committing the migration.</a:t>
-            </a:r>
-          </a:p>
-          <a:p>
+              <a:t>Not a problem! Cost estimates from both Azure Migrate and the Azure Pricing Calculator can be tailored to reflect your EA discount.</a:t>
+            </a:r>
             <a:endParaRPr lang="en-US" sz="2400" dirty="0"/>
           </a:p>
         </p:txBody>
@@ -22953,7 +22474,7 @@
     </p:spTree>
     <p:extLst>
       <p:ext uri="{BB962C8B-B14F-4D97-AF65-F5344CB8AC3E}">
-        <p14:creationId xmlns:p14="http://schemas.microsoft.com/office/powerpoint/2010/main" val="2923730869"/>
+        <p14:creationId xmlns:p14="http://schemas.microsoft.com/office/powerpoint/2010/main" val="2403139044"/>
       </p:ext>
     </p:extLst>
   </p:cSld>
@@ -23027,7 +22548,7 @@
         <p:spPr>
           <a:xfrm>
             <a:off x="269239" y="1189177"/>
-            <a:ext cx="11653523" cy="1994392"/>
+            <a:ext cx="11653523" cy="4210383"/>
           </a:xfrm>
         </p:spPr>
         <p:txBody>
@@ -23042,12 +22563,8 @@
               <a:t>Objection: </a:t>
             </a:r>
             <a:r>
-              <a:rPr lang="en-US" sz="2400" dirty="0">
-                <a:solidFill>
-                  <a:schemeClr val="tx1"/>
-                </a:solidFill>
-              </a:rPr>
-              <a:t>Fabrikam have negotiated an Enterprise Agreement (EA) with Microsoft for their Azure consumption. Any cost estimates need to reflect their EA discount.</a:t>
+              <a:rPr lang="en-US" sz="2400" dirty="0"/>
+              <a:t>Many applications comprise multiple components or tiers. How can you ensure that these migrations are appropriately orchestrated?</a:t>
             </a:r>
           </a:p>
           <a:p>
@@ -23062,21 +22579,25 @@
               <a:t>Answer: </a:t>
             </a:r>
             <a:r>
-              <a:rPr lang="en-US" sz="2400" dirty="0">
-                <a:solidFill>
-                  <a:schemeClr val="tx1"/>
-                </a:solidFill>
-              </a:rPr>
-              <a:t>Not a problem! Cost estimates from both Azure Migrate and the Azure Pricing Calculator can be tailored to reflect your EA discount.</a:t>
-            </a:r>
+              <a:rPr lang="en-US" sz="2400" dirty="0"/>
+              <a:t>Using Azure Migrate, VMs can be grouped to reflect the application architecture. The dependency visualization feature of Azure Migrate helps identify and configure these groupings.</a:t>
+            </a:r>
+          </a:p>
+          <a:p>
             <a:endParaRPr lang="en-US" sz="2400" dirty="0"/>
+          </a:p>
+          <a:p>
+            <a:r>
+              <a:rPr lang="en-US" sz="2400" dirty="0"/>
+              <a:t>The migration process can then be staged to migrate different groups of VMs separately. Custom scripts can be used to perform custom pre- and post-migration operations. Similar orchestration is also supported by third-party migration tools, used for physical servers.</a:t>
+            </a:r>
           </a:p>
         </p:txBody>
       </p:sp>
     </p:spTree>
     <p:extLst>
       <p:ext uri="{BB962C8B-B14F-4D97-AF65-F5344CB8AC3E}">
-        <p14:creationId xmlns:p14="http://schemas.microsoft.com/office/powerpoint/2010/main" val="2403139044"/>
+        <p14:creationId xmlns:p14="http://schemas.microsoft.com/office/powerpoint/2010/main" val="3692539223"/>
       </p:ext>
     </p:extLst>
   </p:cSld>
@@ -23150,7 +22671,7 @@
         <p:spPr>
           <a:xfrm>
             <a:off x="269239" y="1189177"/>
-            <a:ext cx="11653523" cy="4210383"/>
+            <a:ext cx="11653523" cy="4949047"/>
           </a:xfrm>
         </p:spPr>
         <p:txBody>
@@ -23166,7 +22687,7 @@
             </a:r>
             <a:r>
               <a:rPr lang="en-US" sz="2400" dirty="0"/>
-              <a:t>Many applications comprise multiple components or tiers. How can you ensure that these migrations are appropriately orchestrated?</a:t>
+              <a:t>Each migration should be designed to minimize application downtime. There must be an option to fail-back should the migration experience an unexpected problem.</a:t>
             </a:r>
           </a:p>
           <a:p>
@@ -23182,7 +22703,7 @@
             </a:r>
             <a:r>
               <a:rPr lang="en-US" sz="2400" dirty="0"/>
-              <a:t>Using Azure Migrate, VMs can be grouped to reflect the application architecture. The dependency visualization feature of Azure Migrate helps identify and configure these groupings.</a:t>
+              <a:t>To ensure data consistency during migration, a short application downtime may be required. With Azure Migrate, incremental replication keeps the duration of this downtime to a minimum.</a:t>
             </a:r>
           </a:p>
           <a:p>
@@ -23191,7 +22712,16 @@
           <a:p>
             <a:r>
               <a:rPr lang="en-US" sz="2400" dirty="0"/>
-              <a:t>The migration process can then be staged to migrate different groups of VMs separately. Custom scripts can be used to perform custom pre- and post-migration operations. Similar orchestration is also supported by third-party migration tools, used for physical servers.</a:t>
+              <a:t>Similarly, data migration using DMS supports online migration, allowing you to keep your application online while data is synchronized. Only a short downtime window is required to cut over to the new database.</a:t>
+            </a:r>
+          </a:p>
+          <a:p>
+            <a:endParaRPr lang="en-US" sz="2400" dirty="0"/>
+          </a:p>
+          <a:p>
+            <a:r>
+              <a:rPr lang="en-US" sz="2400" dirty="0"/>
+              <a:t>In the event of an unexpected issue arising, the existing deployment remains available as a fail-back.</a:t>
             </a:r>
           </a:p>
         </p:txBody>
@@ -23199,7 +22729,7 @@
     </p:spTree>
     <p:extLst>
       <p:ext uri="{BB962C8B-B14F-4D97-AF65-F5344CB8AC3E}">
-        <p14:creationId xmlns:p14="http://schemas.microsoft.com/office/powerpoint/2010/main" val="3692539223"/>
+        <p14:creationId xmlns:p14="http://schemas.microsoft.com/office/powerpoint/2010/main" val="1920224808"/>
       </p:ext>
     </p:extLst>
   </p:cSld>
@@ -23273,138 +22803,6 @@
         <p:spPr>
           <a:xfrm>
             <a:off x="269239" y="1189177"/>
-            <a:ext cx="11653523" cy="4949047"/>
-          </a:xfrm>
-        </p:spPr>
-        <p:txBody>
-          <a:bodyPr/>
-          <a:lstStyle/>
-          <a:p>
-            <a:r>
-              <a:rPr lang="en-US" sz="2400" dirty="0">
-                <a:latin typeface="Segoe UI Semibold" panose="020B0702040204020203" pitchFamily="34" charset="0"/>
-                <a:cs typeface="Segoe UI Semibold" panose="020B0702040204020203" pitchFamily="34" charset="0"/>
-              </a:rPr>
-              <a:t>Objection: </a:t>
-            </a:r>
-            <a:r>
-              <a:rPr lang="en-US" sz="2400" dirty="0"/>
-              <a:t>Each migration should be designed to minimize application downtime. There must be an option to fail-back should the migration experience an unexpected problem.</a:t>
-            </a:r>
-          </a:p>
-          <a:p>
-            <a:endParaRPr lang="en-US" sz="2400" dirty="0"/>
-          </a:p>
-          <a:p>
-            <a:r>
-              <a:rPr lang="en-US" sz="2400" dirty="0">
-                <a:latin typeface="Segoe UI Semibold" panose="020B0702040204020203" pitchFamily="34" charset="0"/>
-                <a:cs typeface="Segoe UI Semibold" panose="020B0702040204020203" pitchFamily="34" charset="0"/>
-              </a:rPr>
-              <a:t>Answer: </a:t>
-            </a:r>
-            <a:r>
-              <a:rPr lang="en-US" sz="2400" dirty="0"/>
-              <a:t>To ensure data consistency during migration, a short application downtime may be required. With Azure Migrate, incremental replication keeps the duration of this downtime to a minimum.</a:t>
-            </a:r>
-          </a:p>
-          <a:p>
-            <a:endParaRPr lang="en-US" sz="2400" dirty="0"/>
-          </a:p>
-          <a:p>
-            <a:r>
-              <a:rPr lang="en-US" sz="2400" dirty="0"/>
-              <a:t>Similarly, data migration using DMS supports online migration, allowing you to keep your application online while data is synchronized. Only a short downtime window is required to cut over to the new database.</a:t>
-            </a:r>
-          </a:p>
-          <a:p>
-            <a:endParaRPr lang="en-US" sz="2400" dirty="0"/>
-          </a:p>
-          <a:p>
-            <a:r>
-              <a:rPr lang="en-US" sz="2400" dirty="0"/>
-              <a:t>In the event of an unexpected issue arising, the existing deployment remains available as a fail-back.</a:t>
-            </a:r>
-          </a:p>
-        </p:txBody>
-      </p:sp>
-    </p:spTree>
-    <p:extLst>
-      <p:ext uri="{BB962C8B-B14F-4D97-AF65-F5344CB8AC3E}">
-        <p14:creationId xmlns:p14="http://schemas.microsoft.com/office/powerpoint/2010/main" val="1920224808"/>
-      </p:ext>
-    </p:extLst>
-  </p:cSld>
-  <p:clrMapOvr>
-    <a:masterClrMapping/>
-  </p:clrMapOvr>
-  <mc:AlternateContent xmlns:mc="http://schemas.openxmlformats.org/markup-compatibility/2006" xmlns:p14="http://schemas.microsoft.com/office/powerpoint/2010/main">
-    <mc:Choice Requires="p14">
-      <p:transition p14:dur="0"/>
-    </mc:Choice>
-    <mc:Fallback xmlns="">
-      <p:transition/>
-    </mc:Fallback>
-  </mc:AlternateContent>
-</p:sld>
-</file>
-
-<file path=ppt/slides/slide34.xml><?xml version="1.0" encoding="utf-8"?>
-<p:sld xmlns:a="http://schemas.openxmlformats.org/drawingml/2006/main" xmlns:r="http://schemas.openxmlformats.org/officeDocument/2006/relationships" xmlns:p="http://schemas.openxmlformats.org/presentationml/2006/main">
-  <p:cSld>
-    <p:spTree>
-      <p:nvGrpSpPr>
-        <p:cNvPr id="1" name=""/>
-        <p:cNvGrpSpPr/>
-        <p:nvPr/>
-      </p:nvGrpSpPr>
-      <p:grpSpPr>
-        <a:xfrm>
-          <a:off x="0" y="0"/>
-          <a:ext cx="0" cy="0"/>
-          <a:chOff x="0" y="0"/>
-          <a:chExt cx="0" cy="0"/>
-        </a:xfrm>
-      </p:grpSpPr>
-      <p:sp>
-        <p:nvSpPr>
-          <p:cNvPr id="2" name="Title 1"/>
-          <p:cNvSpPr>
-            <a:spLocks noGrp="1"/>
-          </p:cNvSpPr>
-          <p:nvPr>
-            <p:ph type="title"/>
-          </p:nvPr>
-        </p:nvSpPr>
-        <p:spPr/>
-        <p:txBody>
-          <a:bodyPr/>
-          <a:lstStyle/>
-          <a:p>
-            <a:r>
-              <a:rPr lang="en-US" dirty="0"/>
-              <a:t>Preferred objections handling</a:t>
-            </a:r>
-            <a:br>
-              <a:rPr lang="en-US" dirty="0"/>
-            </a:br>
-            <a:endParaRPr lang="en-US" dirty="0"/>
-          </a:p>
-        </p:txBody>
-      </p:sp>
-      <p:sp>
-        <p:nvSpPr>
-          <p:cNvPr id="3" name="Content Placeholder 2"/>
-          <p:cNvSpPr>
-            <a:spLocks noGrp="1"/>
-          </p:cNvSpPr>
-          <p:nvPr>
-            <p:ph type="body" sz="quarter" idx="10"/>
-          </p:nvPr>
-        </p:nvSpPr>
-        <p:spPr>
-          <a:xfrm>
-            <a:off x="269239" y="1189177"/>
             <a:ext cx="11653523" cy="5281446"/>
           </a:xfrm>
         </p:spPr>
@@ -23489,7 +22887,7 @@
 </p:sld>
 </file>
 
-<file path=ppt/slides/slide35.xml><?xml version="1.0" encoding="utf-8"?>
+<file path=ppt/slides/slide34.xml><?xml version="1.0" encoding="utf-8"?>
 <p:sld xmlns:a="http://schemas.openxmlformats.org/drawingml/2006/main" xmlns:r="http://schemas.openxmlformats.org/officeDocument/2006/relationships" xmlns:p="http://schemas.openxmlformats.org/presentationml/2006/main">
   <p:cSld>
     <p:spTree>
@@ -23842,18 +23240,18 @@
   <p:clrMapOvr>
     <a:masterClrMapping/>
   </p:clrMapOvr>
-  <mc:AlternateContent xmlns:mc="http://schemas.openxmlformats.org/markup-compatibility/2006">
-    <mc:Choice xmlns:p14="http://schemas.microsoft.com/office/powerpoint/2010/main" Requires="p14">
+  <mc:AlternateContent xmlns:mc="http://schemas.openxmlformats.org/markup-compatibility/2006" xmlns:p14="http://schemas.microsoft.com/office/powerpoint/2010/main">
+    <mc:Choice Requires="p14">
       <p:transition p14:dur="0"/>
     </mc:Choice>
-    <mc:Fallback>
+    <mc:Fallback xmlns="">
       <p:transition/>
     </mc:Fallback>
   </mc:AlternateContent>
 </p:sld>
 </file>
 
-<file path=ppt/slides/slide36.xml><?xml version="1.0" encoding="utf-8"?>
+<file path=ppt/slides/slide35.xml><?xml version="1.0" encoding="utf-8"?>
 <p:sld xmlns:a="http://schemas.openxmlformats.org/drawingml/2006/main" xmlns:r="http://schemas.openxmlformats.org/officeDocument/2006/relationships" xmlns:p="http://schemas.openxmlformats.org/presentationml/2006/main">
   <p:cSld>
     <p:spTree>
@@ -23969,7 +23367,7 @@
 </p:sld>
 </file>
 
-<file path=ppt/slides/slide37.xml><?xml version="1.0" encoding="utf-8"?>
+<file path=ppt/slides/slide36.xml><?xml version="1.0" encoding="utf-8"?>
 <p:sld xmlns:a="http://schemas.openxmlformats.org/drawingml/2006/main" xmlns:r="http://schemas.openxmlformats.org/officeDocument/2006/relationships" xmlns:p="http://schemas.openxmlformats.org/presentationml/2006/main">
   <p:cSld>
     <p:bg>
@@ -24655,7 +24053,7 @@
         <p:spPr>
           <a:xfrm>
             <a:off x="269239" y="1189177"/>
-            <a:ext cx="11653523" cy="4493538"/>
+            <a:ext cx="11653523" cy="5829288"/>
           </a:xfrm>
         </p:spPr>
         <p:txBody>
@@ -24682,7 +24080,23 @@
           <a:p>
             <a:r>
               <a:rPr lang="en-US" sz="2800" dirty="0"/>
-              <a:t>Post-migration, be able to track costs, control usage, cross-charge business owners, identify cost-saving opportunities, and provide examples of better utilizing resources.</a:t>
+              <a:t>Post-migration, be able to track costs, control usage, cross-charge business owners, identify cost-saving opportunities, and provide examples of better utilizing </a:t>
+            </a:r>
+            <a:r>
+              <a:rPr lang="en-US" sz="2800"/>
+              <a:t>resources.</a:t>
+            </a:r>
+          </a:p>
+          <a:p>
+            <a:pPr marL="0" indent="0">
+              <a:buNone/>
+            </a:pPr>
+            <a:endParaRPr lang="en-US" sz="2800" dirty="0"/>
+          </a:p>
+          <a:p>
+            <a:r>
+              <a:rPr lang="en-US" sz="2800" dirty="0"/>
+              <a:t>What customer services could be more efficiently run or managed by moving them to Azure PaaS services?</a:t>
             </a:r>
           </a:p>
           <a:p>

</xml_diff>